<commit_message>
Do some work on the powerpoint presentation. Update the 'add border' function to handle edge detect on image edges more accurate.
</commit_message>
<xml_diff>
--- a/Detecting Cracks in Concrete Structures Using Adaptive Thresholding.pptx
+++ b/Detecting Cracks in Concrete Structures Using Adaptive Thresholding.pptx
@@ -6,9 +6,11 @@
   </p:sldMasterIdLst>
   <p:sldIdLst>
     <p:sldId id="256" r:id="rId2"/>
-    <p:sldId id="257" r:id="rId3"/>
-    <p:sldId id="258" r:id="rId4"/>
-    <p:sldId id="259" r:id="rId5"/>
+    <p:sldId id="260" r:id="rId3"/>
+    <p:sldId id="261" r:id="rId4"/>
+    <p:sldId id="257" r:id="rId5"/>
+    <p:sldId id="258" r:id="rId6"/>
+    <p:sldId id="259" r:id="rId7"/>
   </p:sldIdLst>
   <p:sldSz cx="12192000" cy="6858000"/>
   <p:notesSz cx="6858000" cy="9144000"/>
@@ -107,6 +109,11 @@
       </a:defRPr>
     </a:lvl9pPr>
   </p:defaultTextStyle>
+  <p:extLst>
+    <p:ext uri="{EFAFB233-063F-42B5-8137-9DF3F51BA10A}">
+      <p15:sldGuideLst xmlns:p15="http://schemas.microsoft.com/office/powerpoint/2012/main"/>
+    </p:ext>
+  </p:extLst>
 </p:presentation>
 </file>
 
@@ -355,7 +362,7 @@
           <a:p>
             <a:fld id="{46DD60CF-1DC4-43D1-92A0-A0FEDF5AD16D}" type="datetimeFigureOut">
               <a:rPr lang="en-US" smtClean="0"/>
-              <a:t>12/9/2017</a:t>
+              <a:t>12/10/2017</a:t>
             </a:fld>
             <a:endParaRPr lang="en-US"/>
           </a:p>
@@ -617,7 +624,7 @@
           <a:p>
             <a:fld id="{46DD60CF-1DC4-43D1-92A0-A0FEDF5AD16D}" type="datetimeFigureOut">
               <a:rPr lang="en-US" smtClean="0"/>
-              <a:t>12/9/2017</a:t>
+              <a:t>12/10/2017</a:t>
             </a:fld>
             <a:endParaRPr lang="en-US"/>
           </a:p>
@@ -852,7 +859,7 @@
           <a:p>
             <a:fld id="{46DD60CF-1DC4-43D1-92A0-A0FEDF5AD16D}" type="datetimeFigureOut">
               <a:rPr lang="en-US" smtClean="0"/>
-              <a:t>12/9/2017</a:t>
+              <a:t>12/10/2017</a:t>
             </a:fld>
             <a:endParaRPr lang="en-US"/>
           </a:p>
@@ -1092,7 +1099,7 @@
           <a:p>
             <a:fld id="{46DD60CF-1DC4-43D1-92A0-A0FEDF5AD16D}" type="datetimeFigureOut">
               <a:rPr lang="en-US" smtClean="0"/>
-              <a:t>12/9/2017</a:t>
+              <a:t>12/10/2017</a:t>
             </a:fld>
             <a:endParaRPr lang="en-US"/>
           </a:p>
@@ -1399,7 +1406,7 @@
           <a:p>
             <a:fld id="{46DD60CF-1DC4-43D1-92A0-A0FEDF5AD16D}" type="datetimeFigureOut">
               <a:rPr lang="en-US" smtClean="0"/>
-              <a:t>12/9/2017</a:t>
+              <a:t>12/10/2017</a:t>
             </a:fld>
             <a:endParaRPr lang="en-US"/>
           </a:p>
@@ -1701,7 +1708,7 @@
           <a:p>
             <a:fld id="{46DD60CF-1DC4-43D1-92A0-A0FEDF5AD16D}" type="datetimeFigureOut">
               <a:rPr lang="en-US" smtClean="0"/>
-              <a:t>12/9/2017</a:t>
+              <a:t>12/10/2017</a:t>
             </a:fld>
             <a:endParaRPr lang="en-US"/>
           </a:p>
@@ -2123,7 +2130,7 @@
           <a:p>
             <a:fld id="{46DD60CF-1DC4-43D1-92A0-A0FEDF5AD16D}" type="datetimeFigureOut">
               <a:rPr lang="en-US" smtClean="0"/>
-              <a:t>12/9/2017</a:t>
+              <a:t>12/10/2017</a:t>
             </a:fld>
             <a:endParaRPr lang="en-US"/>
           </a:p>
@@ -2285,7 +2292,7 @@
           <a:p>
             <a:fld id="{46DD60CF-1DC4-43D1-92A0-A0FEDF5AD16D}" type="datetimeFigureOut">
               <a:rPr lang="en-US" smtClean="0"/>
-              <a:t>12/9/2017</a:t>
+              <a:t>12/10/2017</a:t>
             </a:fld>
             <a:endParaRPr lang="en-US"/>
           </a:p>
@@ -2380,7 +2387,7 @@
           <a:p>
             <a:fld id="{46DD60CF-1DC4-43D1-92A0-A0FEDF5AD16D}" type="datetimeFigureOut">
               <a:rPr lang="en-US" smtClean="0"/>
-              <a:t>12/9/2017</a:t>
+              <a:t>12/10/2017</a:t>
             </a:fld>
             <a:endParaRPr lang="en-US"/>
           </a:p>
@@ -2758,7 +2765,7 @@
           <a:p>
             <a:fld id="{46DD60CF-1DC4-43D1-92A0-A0FEDF5AD16D}" type="datetimeFigureOut">
               <a:rPr lang="en-US" smtClean="0"/>
-              <a:t>12/9/2017</a:t>
+              <a:t>12/10/2017</a:t>
             </a:fld>
             <a:endParaRPr lang="en-US"/>
           </a:p>
@@ -3047,7 +3054,7 @@
           <a:p>
             <a:fld id="{46DD60CF-1DC4-43D1-92A0-A0FEDF5AD16D}" type="datetimeFigureOut">
               <a:rPr lang="en-US" smtClean="0"/>
-              <a:t>12/9/2017</a:t>
+              <a:t>12/10/2017</a:t>
             </a:fld>
             <a:endParaRPr lang="en-US"/>
           </a:p>
@@ -3258,7 +3265,7 @@
           <a:p>
             <a:fld id="{46DD60CF-1DC4-43D1-92A0-A0FEDF5AD16D}" type="datetimeFigureOut">
               <a:rPr lang="en-US" smtClean="0"/>
-              <a:t>12/9/2017</a:t>
+              <a:t>12/10/2017</a:t>
             </a:fld>
             <a:endParaRPr lang="en-US"/>
           </a:p>
@@ -3980,6 +3987,360 @@
       </p:grpSpPr>
       <p:sp>
         <p:nvSpPr>
+          <p:cNvPr id="2" name="Title 1"/>
+          <p:cNvSpPr>
+            <a:spLocks noGrp="1"/>
+          </p:cNvSpPr>
+          <p:nvPr>
+            <p:ph type="title"/>
+          </p:nvPr>
+        </p:nvSpPr>
+        <p:spPr/>
+        <p:txBody>
+          <a:bodyPr/>
+          <a:lstStyle/>
+          <a:p>
+            <a:r>
+              <a:rPr lang="en-US" dirty="0" smtClean="0"/>
+              <a:t>Desired Outcomes</a:t>
+            </a:r>
+            <a:endParaRPr lang="en-US" dirty="0"/>
+          </a:p>
+        </p:txBody>
+      </p:sp>
+      <p:sp>
+        <p:nvSpPr>
+          <p:cNvPr id="3" name="Content Placeholder 2"/>
+          <p:cNvSpPr>
+            <a:spLocks noGrp="1"/>
+          </p:cNvSpPr>
+          <p:nvPr>
+            <p:ph sz="half" idx="1"/>
+          </p:nvPr>
+        </p:nvSpPr>
+        <p:spPr>
+          <a:xfrm>
+            <a:off x="581193" y="2228003"/>
+            <a:ext cx="2688218" cy="3633047"/>
+          </a:xfrm>
+        </p:spPr>
+        <p:txBody>
+          <a:bodyPr/>
+          <a:lstStyle/>
+          <a:p>
+            <a:endParaRPr lang="en-US" dirty="0"/>
+          </a:p>
+        </p:txBody>
+      </p:sp>
+      <p:sp>
+        <p:nvSpPr>
+          <p:cNvPr id="6" name="TextBox 5"/>
+          <p:cNvSpPr txBox="1"/>
+          <p:nvPr/>
+        </p:nvSpPr>
+        <p:spPr>
+          <a:xfrm>
+            <a:off x="3994030" y="2751864"/>
+            <a:ext cx="7142326" cy="2585323"/>
+          </a:xfrm>
+          <a:prstGeom prst="rect">
+            <a:avLst/>
+          </a:prstGeom>
+          <a:noFill/>
+        </p:spPr>
+        <p:txBody>
+          <a:bodyPr wrap="square" rtlCol="0">
+            <a:spAutoFit/>
+          </a:bodyPr>
+          <a:lstStyle/>
+          <a:p>
+            <a:pPr marL="285750" indent="-285750">
+              <a:buFont typeface="Arial" panose="020B0604020202020204" pitchFamily="34" charset="0"/>
+              <a:buChar char="•"/>
+            </a:pPr>
+            <a:r>
+              <a:rPr lang="en-US" dirty="0" smtClean="0"/>
+              <a:t>Desired Outcomes:</a:t>
+            </a:r>
+          </a:p>
+          <a:p>
+            <a:pPr marL="285750" indent="-285750">
+              <a:buFont typeface="Arial" panose="020B0604020202020204" pitchFamily="34" charset="0"/>
+              <a:buChar char="•"/>
+            </a:pPr>
+            <a:endParaRPr lang="en-US" dirty="0" smtClean="0"/>
+          </a:p>
+          <a:p>
+            <a:pPr marL="742950" lvl="1" indent="-285750">
+              <a:buFont typeface="Arial" panose="020B0604020202020204" pitchFamily="34" charset="0"/>
+              <a:buChar char="•"/>
+            </a:pPr>
+            <a:r>
+              <a:rPr lang="en-US" dirty="0" smtClean="0"/>
+              <a:t>“Improved Simplified Novel Method for Edge Detection in Grayscale Images Using Adaptive </a:t>
+            </a:r>
+            <a:r>
+              <a:rPr lang="en-US" dirty="0" err="1" smtClean="0"/>
+              <a:t>Thresholding</a:t>
+            </a:r>
+            <a:r>
+              <a:rPr lang="en-US" dirty="0" smtClean="0"/>
+              <a:t>”</a:t>
+            </a:r>
+          </a:p>
+          <a:p>
+            <a:pPr marL="742950" lvl="1" indent="-285750">
+              <a:buFont typeface="Arial" panose="020B0604020202020204" pitchFamily="34" charset="0"/>
+              <a:buChar char="•"/>
+            </a:pPr>
+            <a:endParaRPr lang="en-US" dirty="0" smtClean="0"/>
+          </a:p>
+          <a:p>
+            <a:pPr marL="742950" lvl="1" indent="-285750">
+              <a:buFont typeface="Arial" panose="020B0604020202020204" pitchFamily="34" charset="0"/>
+              <a:buChar char="•"/>
+            </a:pPr>
+            <a:r>
+              <a:rPr lang="en-US" dirty="0" smtClean="0"/>
+              <a:t>Improve the simplified adaptive </a:t>
+            </a:r>
+            <a:r>
+              <a:rPr lang="en-US" dirty="0" err="1" smtClean="0"/>
+              <a:t>thresholding</a:t>
+            </a:r>
+            <a:r>
+              <a:rPr lang="en-US" dirty="0" smtClean="0"/>
+              <a:t> technique</a:t>
+            </a:r>
+          </a:p>
+          <a:p>
+            <a:pPr marL="742950" lvl="1" indent="-285750">
+              <a:buFont typeface="Arial" panose="020B0604020202020204" pitchFamily="34" charset="0"/>
+              <a:buChar char="•"/>
+            </a:pPr>
+            <a:endParaRPr lang="en-US" dirty="0" smtClean="0"/>
+          </a:p>
+          <a:p>
+            <a:pPr marL="742950" lvl="1" indent="-285750">
+              <a:buFont typeface="Arial" panose="020B0604020202020204" pitchFamily="34" charset="0"/>
+              <a:buChar char="•"/>
+            </a:pPr>
+            <a:r>
+              <a:rPr lang="en-US" dirty="0" smtClean="0"/>
+              <a:t>Expand on the adaptive </a:t>
+            </a:r>
+            <a:r>
+              <a:rPr lang="en-US" dirty="0" err="1" smtClean="0"/>
+              <a:t>thresholding</a:t>
+            </a:r>
+            <a:r>
+              <a:rPr lang="en-US" dirty="0" smtClean="0"/>
+              <a:t> technique, such that it works well with detecting cracks in concrete structures</a:t>
+            </a:r>
+            <a:endParaRPr lang="en-US" dirty="0"/>
+          </a:p>
+        </p:txBody>
+      </p:sp>
+    </p:spTree>
+    <p:extLst>
+      <p:ext uri="{BB962C8B-B14F-4D97-AF65-F5344CB8AC3E}">
+        <p14:creationId xmlns:p14="http://schemas.microsoft.com/office/powerpoint/2010/main" val="2151074995"/>
+      </p:ext>
+    </p:extLst>
+  </p:cSld>
+  <p:clrMapOvr>
+    <a:masterClrMapping/>
+  </p:clrMapOvr>
+</p:sld>
+</file>
+
+<file path=ppt/slides/slide3.xml><?xml version="1.0" encoding="utf-8"?>
+<p:sld xmlns:a="http://schemas.openxmlformats.org/drawingml/2006/main" xmlns:r="http://schemas.openxmlformats.org/officeDocument/2006/relationships" xmlns:p="http://schemas.openxmlformats.org/presentationml/2006/main">
+  <p:cSld>
+    <p:spTree>
+      <p:nvGrpSpPr>
+        <p:cNvPr id="1" name=""/>
+        <p:cNvGrpSpPr/>
+        <p:nvPr/>
+      </p:nvGrpSpPr>
+      <p:grpSpPr>
+        <a:xfrm>
+          <a:off x="0" y="0"/>
+          <a:ext cx="0" cy="0"/>
+          <a:chOff x="0" y="0"/>
+          <a:chExt cx="0" cy="0"/>
+        </a:xfrm>
+      </p:grpSpPr>
+      <p:sp>
+        <p:nvSpPr>
+          <p:cNvPr id="2" name="Title 1"/>
+          <p:cNvSpPr>
+            <a:spLocks noGrp="1"/>
+          </p:cNvSpPr>
+          <p:nvPr>
+            <p:ph type="title"/>
+          </p:nvPr>
+        </p:nvSpPr>
+        <p:spPr/>
+        <p:txBody>
+          <a:bodyPr/>
+          <a:lstStyle/>
+          <a:p>
+            <a:r>
+              <a:rPr lang="en-US" dirty="0" smtClean="0"/>
+              <a:t>Related Methods (categories)</a:t>
+            </a:r>
+            <a:endParaRPr lang="en-US" dirty="0"/>
+          </a:p>
+        </p:txBody>
+      </p:sp>
+      <p:sp>
+        <p:nvSpPr>
+          <p:cNvPr id="3" name="Content Placeholder 2"/>
+          <p:cNvSpPr>
+            <a:spLocks noGrp="1"/>
+          </p:cNvSpPr>
+          <p:nvPr>
+            <p:ph sz="half" idx="1"/>
+          </p:nvPr>
+        </p:nvSpPr>
+        <p:spPr>
+          <a:xfrm>
+            <a:off x="581193" y="2228003"/>
+            <a:ext cx="2688218" cy="3633047"/>
+          </a:xfrm>
+        </p:spPr>
+        <p:txBody>
+          <a:bodyPr/>
+          <a:lstStyle/>
+          <a:p>
+            <a:endParaRPr lang="en-US" dirty="0"/>
+          </a:p>
+        </p:txBody>
+      </p:sp>
+      <p:sp>
+        <p:nvSpPr>
+          <p:cNvPr id="6" name="TextBox 5"/>
+          <p:cNvSpPr txBox="1"/>
+          <p:nvPr/>
+        </p:nvSpPr>
+        <p:spPr>
+          <a:xfrm>
+            <a:off x="3994030" y="2751864"/>
+            <a:ext cx="7142326" cy="1754326"/>
+          </a:xfrm>
+          <a:prstGeom prst="rect">
+            <a:avLst/>
+          </a:prstGeom>
+          <a:noFill/>
+        </p:spPr>
+        <p:txBody>
+          <a:bodyPr wrap="square" rtlCol="0">
+            <a:spAutoFit/>
+          </a:bodyPr>
+          <a:lstStyle/>
+          <a:p>
+            <a:pPr marL="285750" indent="-285750">
+              <a:buFont typeface="Arial" panose="020B0604020202020204" pitchFamily="34" charset="0"/>
+              <a:buChar char="•"/>
+            </a:pPr>
+            <a:r>
+              <a:rPr lang="en-US" dirty="0" smtClean="0"/>
+              <a:t>The adaptive </a:t>
+            </a:r>
+            <a:r>
+              <a:rPr lang="en-US" dirty="0" err="1" smtClean="0"/>
+              <a:t>thresholding</a:t>
+            </a:r>
+            <a:r>
+              <a:rPr lang="en-US" dirty="0" smtClean="0"/>
+              <a:t> technique is related to gradient operators (</a:t>
+            </a:r>
+            <a:r>
+              <a:rPr lang="en-US" dirty="0" err="1" smtClean="0"/>
+              <a:t>e.g</a:t>
+            </a:r>
+            <a:r>
+              <a:rPr lang="en-US" dirty="0" smtClean="0"/>
+              <a:t> Prewitt or Sobel)</a:t>
+            </a:r>
+          </a:p>
+          <a:p>
+            <a:endParaRPr lang="en-US" dirty="0" smtClean="0"/>
+          </a:p>
+          <a:p>
+            <a:pPr marL="285750" indent="-285750">
+              <a:buFont typeface="Arial" panose="020B0604020202020204" pitchFamily="34" charset="0"/>
+              <a:buChar char="•"/>
+            </a:pPr>
+            <a:r>
+              <a:rPr lang="en-US" dirty="0" smtClean="0"/>
+              <a:t>Is a first order derivative of the </a:t>
+            </a:r>
+            <a:r>
+              <a:rPr lang="en-US" b="1" dirty="0" smtClean="0"/>
+              <a:t>gradient operator</a:t>
+            </a:r>
+          </a:p>
+          <a:p>
+            <a:endParaRPr lang="en-US" dirty="0" smtClean="0"/>
+          </a:p>
+          <a:p>
+            <a:pPr marL="285750" indent="-285750">
+              <a:buFont typeface="Arial" panose="020B0604020202020204" pitchFamily="34" charset="0"/>
+              <a:buChar char="•"/>
+            </a:pPr>
+            <a:r>
+              <a:rPr lang="en-US" dirty="0" smtClean="0"/>
+              <a:t>Adaptive </a:t>
+            </a:r>
+            <a:r>
+              <a:rPr lang="en-US" dirty="0" err="1" smtClean="0"/>
+              <a:t>thresholding</a:t>
+            </a:r>
+            <a:r>
+              <a:rPr lang="en-US" dirty="0" smtClean="0"/>
+              <a:t> is based on </a:t>
+            </a:r>
+            <a:r>
+              <a:rPr lang="en-US" b="1" dirty="0" smtClean="0"/>
+              <a:t>similarity detection</a:t>
+            </a:r>
+          </a:p>
+        </p:txBody>
+      </p:sp>
+    </p:spTree>
+    <p:extLst>
+      <p:ext uri="{BB962C8B-B14F-4D97-AF65-F5344CB8AC3E}">
+        <p14:creationId xmlns:p14="http://schemas.microsoft.com/office/powerpoint/2010/main" val="2170241273"/>
+      </p:ext>
+    </p:extLst>
+  </p:cSld>
+  <p:clrMapOvr>
+    <a:masterClrMapping/>
+  </p:clrMapOvr>
+</p:sld>
+</file>
+
+<file path=ppt/slides/slide4.xml><?xml version="1.0" encoding="utf-8"?>
+<p:sld xmlns:a="http://schemas.openxmlformats.org/drawingml/2006/main" xmlns:r="http://schemas.openxmlformats.org/officeDocument/2006/relationships" xmlns:p="http://schemas.openxmlformats.org/presentationml/2006/main">
+  <p:cSld>
+    <p:spTree>
+      <p:nvGrpSpPr>
+        <p:cNvPr id="1" name=""/>
+        <p:cNvGrpSpPr/>
+        <p:nvPr/>
+      </p:nvGrpSpPr>
+      <p:grpSpPr>
+        <a:xfrm>
+          <a:off x="0" y="0"/>
+          <a:ext cx="0" cy="0"/>
+          <a:chOff x="0" y="0"/>
+          <a:chExt cx="0" cy="0"/>
+        </a:xfrm>
+      </p:grpSpPr>
+      <p:sp>
+        <p:nvSpPr>
           <p:cNvPr id="4" name="Title 3"/>
           <p:cNvSpPr>
             <a:spLocks noGrp="1"/>
@@ -3995,7 +4356,11 @@
           <a:p>
             <a:r>
               <a:rPr lang="en-US" dirty="0" smtClean="0"/>
-              <a:t>The Proposed Workflow</a:t>
+              <a:t>The Proposed </a:t>
+            </a:r>
+            <a:r>
+              <a:rPr lang="en-US" dirty="0" smtClean="0"/>
+              <a:t>Approach</a:t>
             </a:r>
             <a:endParaRPr lang="en-US" dirty="0"/>
           </a:p>
@@ -4134,7 +4499,7 @@
 </p:sld>
 </file>
 
-<file path=ppt/slides/slide3.xml><?xml version="1.0" encoding="utf-8"?>
+<file path=ppt/slides/slide5.xml><?xml version="1.0" encoding="utf-8"?>
 <p:sld xmlns:a="http://schemas.openxmlformats.org/drawingml/2006/main" xmlns:r="http://schemas.openxmlformats.org/officeDocument/2006/relationships" xmlns:p="http://schemas.openxmlformats.org/presentationml/2006/main">
   <p:cSld>
     <p:spTree>
@@ -4218,7 +4583,7 @@
 </p:sld>
 </file>
 
-<file path=ppt/slides/slide4.xml><?xml version="1.0" encoding="utf-8"?>
+<file path=ppt/slides/slide6.xml><?xml version="1.0" encoding="utf-8"?>
 <p:sld xmlns:a="http://schemas.openxmlformats.org/drawingml/2006/main" xmlns:r="http://schemas.openxmlformats.org/officeDocument/2006/relationships" xmlns:p="http://schemas.openxmlformats.org/presentationml/2006/main">
   <p:cSld>
     <p:spTree>

</xml_diff>

<commit_message>
Work on powerpoint some more... Apply some scenarios to produce some images.
</commit_message>
<xml_diff>
--- a/Detecting Cracks in Concrete Structures Using Adaptive Thresholding.pptx
+++ b/Detecting Cracks in Concrete Structures Using Adaptive Thresholding.pptx
@@ -10,7 +10,16 @@
     <p:sldId id="261" r:id="rId4"/>
     <p:sldId id="257" r:id="rId5"/>
     <p:sldId id="258" r:id="rId6"/>
-    <p:sldId id="259" r:id="rId7"/>
+    <p:sldId id="262" r:id="rId7"/>
+    <p:sldId id="263" r:id="rId8"/>
+    <p:sldId id="264" r:id="rId9"/>
+    <p:sldId id="265" r:id="rId10"/>
+    <p:sldId id="266" r:id="rId11"/>
+    <p:sldId id="267" r:id="rId12"/>
+    <p:sldId id="269" r:id="rId13"/>
+    <p:sldId id="270" r:id="rId14"/>
+    <p:sldId id="271" r:id="rId15"/>
+    <p:sldId id="272" r:id="rId16"/>
   </p:sldIdLst>
   <p:sldSz cx="12192000" cy="6858000"/>
   <p:notesSz cx="6858000" cy="9144000"/>
@@ -3903,7 +3912,11 @@
             </a:r>
             <a:r>
               <a:rPr lang="en-US" dirty="0" smtClean="0"/>
-              <a:t> for Image Segmentation</a:t>
+              <a:t> for </a:t>
+            </a:r>
+            <a:r>
+              <a:rPr lang="en-US" dirty="0" smtClean="0"/>
+              <a:t>Image Segmentation</a:t>
             </a:r>
             <a:endParaRPr lang="en-US" dirty="0"/>
           </a:p>
@@ -3952,6 +3965,1021 @@
     <p:extLst>
       <p:ext uri="{BB962C8B-B14F-4D97-AF65-F5344CB8AC3E}">
         <p14:creationId xmlns:p14="http://schemas.microsoft.com/office/powerpoint/2010/main" val="3130998479"/>
+      </p:ext>
+    </p:extLst>
+  </p:cSld>
+  <p:clrMapOvr>
+    <a:masterClrMapping/>
+  </p:clrMapOvr>
+  <p:timing>
+    <p:tnLst>
+      <p:par>
+        <p:cTn id="1" dur="indefinite" restart="never" nodeType="tmRoot"/>
+      </p:par>
+    </p:tnLst>
+  </p:timing>
+</p:sld>
+</file>
+
+<file path=ppt/slides/slide10.xml><?xml version="1.0" encoding="utf-8"?>
+<p:sld xmlns:a="http://schemas.openxmlformats.org/drawingml/2006/main" xmlns:r="http://schemas.openxmlformats.org/officeDocument/2006/relationships" xmlns:p="http://schemas.openxmlformats.org/presentationml/2006/main">
+  <p:cSld>
+    <p:spTree>
+      <p:nvGrpSpPr>
+        <p:cNvPr id="1" name=""/>
+        <p:cNvGrpSpPr/>
+        <p:nvPr/>
+      </p:nvGrpSpPr>
+      <p:grpSpPr>
+        <a:xfrm>
+          <a:off x="0" y="0"/>
+          <a:ext cx="0" cy="0"/>
+          <a:chOff x="0" y="0"/>
+          <a:chExt cx="0" cy="0"/>
+        </a:xfrm>
+      </p:grpSpPr>
+      <p:sp>
+        <p:nvSpPr>
+          <p:cNvPr id="2" name="Title 1"/>
+          <p:cNvSpPr>
+            <a:spLocks noGrp="1"/>
+          </p:cNvSpPr>
+          <p:nvPr>
+            <p:ph type="title"/>
+          </p:nvPr>
+        </p:nvSpPr>
+        <p:spPr/>
+        <p:txBody>
+          <a:bodyPr/>
+          <a:lstStyle/>
+          <a:p>
+            <a:r>
+              <a:rPr lang="en-US" dirty="0" smtClean="0"/>
+              <a:t>My Improvements on the proposed </a:t>
+            </a:r>
+            <a:r>
+              <a:rPr lang="en-US" dirty="0"/>
+              <a:t>approach (continued)</a:t>
+            </a:r>
+            <a:endParaRPr lang="en-US" dirty="0"/>
+          </a:p>
+        </p:txBody>
+      </p:sp>
+      <p:sp>
+        <p:nvSpPr>
+          <p:cNvPr id="3" name="Content Placeholder 2"/>
+          <p:cNvSpPr>
+            <a:spLocks noGrp="1"/>
+          </p:cNvSpPr>
+          <p:nvPr>
+            <p:ph sz="half" idx="1"/>
+          </p:nvPr>
+        </p:nvSpPr>
+        <p:spPr>
+          <a:xfrm>
+            <a:off x="581193" y="2228003"/>
+            <a:ext cx="2688218" cy="3633047"/>
+          </a:xfrm>
+        </p:spPr>
+        <p:txBody>
+          <a:bodyPr/>
+          <a:lstStyle/>
+          <a:p>
+            <a:endParaRPr lang="en-US" dirty="0"/>
+          </a:p>
+        </p:txBody>
+      </p:sp>
+      <p:pic>
+        <p:nvPicPr>
+          <p:cNvPr id="4" name="Picture 3"/>
+          <p:cNvPicPr>
+            <a:picLocks noChangeAspect="1"/>
+          </p:cNvPicPr>
+          <p:nvPr/>
+        </p:nvPicPr>
+        <p:blipFill>
+          <a:blip r:embed="rId2"/>
+          <a:stretch>
+            <a:fillRect/>
+          </a:stretch>
+        </p:blipFill>
+        <p:spPr>
+          <a:xfrm>
+            <a:off x="202774" y="2748407"/>
+            <a:ext cx="11786454" cy="2592237"/>
+          </a:xfrm>
+          <a:prstGeom prst="rect">
+            <a:avLst/>
+          </a:prstGeom>
+        </p:spPr>
+      </p:pic>
+    </p:spTree>
+    <p:extLst>
+      <p:ext uri="{BB962C8B-B14F-4D97-AF65-F5344CB8AC3E}">
+        <p14:creationId xmlns:p14="http://schemas.microsoft.com/office/powerpoint/2010/main" val="1817159471"/>
+      </p:ext>
+    </p:extLst>
+  </p:cSld>
+  <p:clrMapOvr>
+    <a:masterClrMapping/>
+  </p:clrMapOvr>
+  <p:timing>
+    <p:tnLst>
+      <p:par>
+        <p:cTn id="1" dur="indefinite" restart="never" nodeType="tmRoot"/>
+      </p:par>
+    </p:tnLst>
+  </p:timing>
+</p:sld>
+</file>
+
+<file path=ppt/slides/slide11.xml><?xml version="1.0" encoding="utf-8"?>
+<p:sld xmlns:a="http://schemas.openxmlformats.org/drawingml/2006/main" xmlns:r="http://schemas.openxmlformats.org/officeDocument/2006/relationships" xmlns:p="http://schemas.openxmlformats.org/presentationml/2006/main">
+  <p:cSld>
+    <p:spTree>
+      <p:nvGrpSpPr>
+        <p:cNvPr id="1" name=""/>
+        <p:cNvGrpSpPr/>
+        <p:nvPr/>
+      </p:nvGrpSpPr>
+      <p:grpSpPr>
+        <a:xfrm>
+          <a:off x="0" y="0"/>
+          <a:ext cx="0" cy="0"/>
+          <a:chOff x="0" y="0"/>
+          <a:chExt cx="0" cy="0"/>
+        </a:xfrm>
+      </p:grpSpPr>
+      <p:sp>
+        <p:nvSpPr>
+          <p:cNvPr id="2" name="Title 1"/>
+          <p:cNvSpPr>
+            <a:spLocks noGrp="1"/>
+          </p:cNvSpPr>
+          <p:nvPr>
+            <p:ph type="title"/>
+          </p:nvPr>
+        </p:nvSpPr>
+        <p:spPr/>
+        <p:txBody>
+          <a:bodyPr/>
+          <a:lstStyle/>
+          <a:p>
+            <a:r>
+              <a:rPr lang="en-US" dirty="0" smtClean="0"/>
+              <a:t>My Improvements on the proposed </a:t>
+            </a:r>
+            <a:r>
+              <a:rPr lang="en-US" dirty="0"/>
+              <a:t>approach (continued)</a:t>
+            </a:r>
+            <a:endParaRPr lang="en-US" dirty="0"/>
+          </a:p>
+        </p:txBody>
+      </p:sp>
+      <p:sp>
+        <p:nvSpPr>
+          <p:cNvPr id="3" name="Content Placeholder 2"/>
+          <p:cNvSpPr>
+            <a:spLocks noGrp="1"/>
+          </p:cNvSpPr>
+          <p:nvPr>
+            <p:ph sz="half" idx="1"/>
+          </p:nvPr>
+        </p:nvSpPr>
+        <p:spPr>
+          <a:xfrm>
+            <a:off x="581193" y="2228003"/>
+            <a:ext cx="2688218" cy="3633047"/>
+          </a:xfrm>
+        </p:spPr>
+        <p:txBody>
+          <a:bodyPr/>
+          <a:lstStyle/>
+          <a:p>
+            <a:endParaRPr lang="en-US" dirty="0"/>
+          </a:p>
+        </p:txBody>
+      </p:sp>
+      <p:pic>
+        <p:nvPicPr>
+          <p:cNvPr id="5" name="Picture 4"/>
+          <p:cNvPicPr>
+            <a:picLocks noChangeAspect="1"/>
+          </p:cNvPicPr>
+          <p:nvPr/>
+        </p:nvPicPr>
+        <p:blipFill>
+          <a:blip r:embed="rId2"/>
+          <a:stretch>
+            <a:fillRect/>
+          </a:stretch>
+        </p:blipFill>
+        <p:spPr>
+          <a:xfrm>
+            <a:off x="4260469" y="2725697"/>
+            <a:ext cx="7778239" cy="2637657"/>
+          </a:xfrm>
+          <a:prstGeom prst="rect">
+            <a:avLst/>
+          </a:prstGeom>
+        </p:spPr>
+      </p:pic>
+      <p:pic>
+        <p:nvPicPr>
+          <p:cNvPr id="6" name="Picture 5"/>
+          <p:cNvPicPr>
+            <a:picLocks noChangeAspect="1"/>
+          </p:cNvPicPr>
+          <p:nvPr/>
+        </p:nvPicPr>
+        <p:blipFill>
+          <a:blip r:embed="rId3"/>
+          <a:stretch>
+            <a:fillRect/>
+          </a:stretch>
+        </p:blipFill>
+        <p:spPr>
+          <a:xfrm>
+            <a:off x="81839" y="2780967"/>
+            <a:ext cx="3420485" cy="2582387"/>
+          </a:xfrm>
+          <a:prstGeom prst="rect">
+            <a:avLst/>
+          </a:prstGeom>
+        </p:spPr>
+      </p:pic>
+    </p:spTree>
+    <p:extLst>
+      <p:ext uri="{BB962C8B-B14F-4D97-AF65-F5344CB8AC3E}">
+        <p14:creationId xmlns:p14="http://schemas.microsoft.com/office/powerpoint/2010/main" val="3011564094"/>
+      </p:ext>
+    </p:extLst>
+  </p:cSld>
+  <p:clrMapOvr>
+    <a:masterClrMapping/>
+  </p:clrMapOvr>
+  <p:timing>
+    <p:tnLst>
+      <p:par>
+        <p:cTn id="1" dur="indefinite" restart="never" nodeType="tmRoot"/>
+      </p:par>
+    </p:tnLst>
+  </p:timing>
+</p:sld>
+</file>
+
+<file path=ppt/slides/slide12.xml><?xml version="1.0" encoding="utf-8"?>
+<p:sld xmlns:a="http://schemas.openxmlformats.org/drawingml/2006/main" xmlns:r="http://schemas.openxmlformats.org/officeDocument/2006/relationships" xmlns:p="http://schemas.openxmlformats.org/presentationml/2006/main">
+  <p:cSld>
+    <p:spTree>
+      <p:nvGrpSpPr>
+        <p:cNvPr id="1" name=""/>
+        <p:cNvGrpSpPr/>
+        <p:nvPr/>
+      </p:nvGrpSpPr>
+      <p:grpSpPr>
+        <a:xfrm>
+          <a:off x="0" y="0"/>
+          <a:ext cx="0" cy="0"/>
+          <a:chOff x="0" y="0"/>
+          <a:chExt cx="0" cy="0"/>
+        </a:xfrm>
+      </p:grpSpPr>
+      <p:sp>
+        <p:nvSpPr>
+          <p:cNvPr id="2" name="Title 1"/>
+          <p:cNvSpPr>
+            <a:spLocks noGrp="1"/>
+          </p:cNvSpPr>
+          <p:nvPr>
+            <p:ph type="title"/>
+          </p:nvPr>
+        </p:nvSpPr>
+        <p:spPr/>
+        <p:txBody>
+          <a:bodyPr/>
+          <a:lstStyle/>
+          <a:p>
+            <a:r>
+              <a:rPr lang="en-US" dirty="0" smtClean="0"/>
+              <a:t>My Improvements on the proposed </a:t>
+            </a:r>
+            <a:r>
+              <a:rPr lang="en-US" dirty="0"/>
+              <a:t>approach (continued)</a:t>
+            </a:r>
+            <a:endParaRPr lang="en-US" dirty="0"/>
+          </a:p>
+        </p:txBody>
+      </p:sp>
+      <p:sp>
+        <p:nvSpPr>
+          <p:cNvPr id="3" name="Content Placeholder 2"/>
+          <p:cNvSpPr>
+            <a:spLocks noGrp="1"/>
+          </p:cNvSpPr>
+          <p:nvPr>
+            <p:ph sz="half" idx="1"/>
+          </p:nvPr>
+        </p:nvSpPr>
+        <p:spPr>
+          <a:xfrm>
+            <a:off x="581193" y="2228003"/>
+            <a:ext cx="2688218" cy="3633047"/>
+          </a:xfrm>
+        </p:spPr>
+        <p:txBody>
+          <a:bodyPr/>
+          <a:lstStyle/>
+          <a:p>
+            <a:endParaRPr lang="en-US" dirty="0"/>
+          </a:p>
+        </p:txBody>
+      </p:sp>
+      <p:pic>
+        <p:nvPicPr>
+          <p:cNvPr id="4" name="Picture 3"/>
+          <p:cNvPicPr>
+            <a:picLocks noChangeAspect="1"/>
+          </p:cNvPicPr>
+          <p:nvPr/>
+        </p:nvPicPr>
+        <p:blipFill>
+          <a:blip r:embed="rId2"/>
+          <a:stretch>
+            <a:fillRect/>
+          </a:stretch>
+        </p:blipFill>
+        <p:spPr>
+          <a:xfrm>
+            <a:off x="4277723" y="2725697"/>
+            <a:ext cx="7748118" cy="2637657"/>
+          </a:xfrm>
+          <a:prstGeom prst="rect">
+            <a:avLst/>
+          </a:prstGeom>
+        </p:spPr>
+      </p:pic>
+      <p:pic>
+        <p:nvPicPr>
+          <p:cNvPr id="7" name="Picture 6"/>
+          <p:cNvPicPr>
+            <a:picLocks noChangeAspect="1"/>
+          </p:cNvPicPr>
+          <p:nvPr/>
+        </p:nvPicPr>
+        <p:blipFill>
+          <a:blip r:embed="rId3"/>
+          <a:stretch>
+            <a:fillRect/>
+          </a:stretch>
+        </p:blipFill>
+        <p:spPr>
+          <a:xfrm>
+            <a:off x="120769" y="2835167"/>
+            <a:ext cx="3355405" cy="2528187"/>
+          </a:xfrm>
+          <a:prstGeom prst="rect">
+            <a:avLst/>
+          </a:prstGeom>
+        </p:spPr>
+      </p:pic>
+    </p:spTree>
+    <p:extLst>
+      <p:ext uri="{BB962C8B-B14F-4D97-AF65-F5344CB8AC3E}">
+        <p14:creationId xmlns:p14="http://schemas.microsoft.com/office/powerpoint/2010/main" val="3714516843"/>
+      </p:ext>
+    </p:extLst>
+  </p:cSld>
+  <p:clrMapOvr>
+    <a:masterClrMapping/>
+  </p:clrMapOvr>
+  <p:timing>
+    <p:tnLst>
+      <p:par>
+        <p:cTn id="1" dur="indefinite" restart="never" nodeType="tmRoot"/>
+      </p:par>
+    </p:tnLst>
+  </p:timing>
+</p:sld>
+</file>
+
+<file path=ppt/slides/slide13.xml><?xml version="1.0" encoding="utf-8"?>
+<p:sld xmlns:a="http://schemas.openxmlformats.org/drawingml/2006/main" xmlns:r="http://schemas.openxmlformats.org/officeDocument/2006/relationships" xmlns:p="http://schemas.openxmlformats.org/presentationml/2006/main">
+  <p:cSld>
+    <p:spTree>
+      <p:nvGrpSpPr>
+        <p:cNvPr id="1" name=""/>
+        <p:cNvGrpSpPr/>
+        <p:nvPr/>
+      </p:nvGrpSpPr>
+      <p:grpSpPr>
+        <a:xfrm>
+          <a:off x="0" y="0"/>
+          <a:ext cx="0" cy="0"/>
+          <a:chOff x="0" y="0"/>
+          <a:chExt cx="0" cy="0"/>
+        </a:xfrm>
+      </p:grpSpPr>
+      <p:sp>
+        <p:nvSpPr>
+          <p:cNvPr id="2" name="Title 1"/>
+          <p:cNvSpPr>
+            <a:spLocks noGrp="1"/>
+          </p:cNvSpPr>
+          <p:nvPr>
+            <p:ph type="title"/>
+          </p:nvPr>
+        </p:nvSpPr>
+        <p:spPr/>
+        <p:txBody>
+          <a:bodyPr/>
+          <a:lstStyle/>
+          <a:p>
+            <a:r>
+              <a:rPr lang="en-US" dirty="0" smtClean="0"/>
+              <a:t>My Improvements on the proposed </a:t>
+            </a:r>
+            <a:r>
+              <a:rPr lang="en-US" dirty="0"/>
+              <a:t>approach (continued)</a:t>
+            </a:r>
+            <a:endParaRPr lang="en-US" dirty="0"/>
+          </a:p>
+        </p:txBody>
+      </p:sp>
+      <p:sp>
+        <p:nvSpPr>
+          <p:cNvPr id="3" name="Content Placeholder 2"/>
+          <p:cNvSpPr>
+            <a:spLocks noGrp="1"/>
+          </p:cNvSpPr>
+          <p:nvPr>
+            <p:ph sz="half" idx="1"/>
+          </p:nvPr>
+        </p:nvSpPr>
+        <p:spPr>
+          <a:xfrm>
+            <a:off x="581193" y="2228003"/>
+            <a:ext cx="2688218" cy="3633047"/>
+          </a:xfrm>
+        </p:spPr>
+        <p:txBody>
+          <a:bodyPr/>
+          <a:lstStyle/>
+          <a:p>
+            <a:endParaRPr lang="en-US" dirty="0"/>
+          </a:p>
+        </p:txBody>
+      </p:sp>
+      <p:pic>
+        <p:nvPicPr>
+          <p:cNvPr id="8" name="Picture 7"/>
+          <p:cNvPicPr>
+            <a:picLocks noChangeAspect="1"/>
+          </p:cNvPicPr>
+          <p:nvPr/>
+        </p:nvPicPr>
+        <p:blipFill>
+          <a:blip r:embed="rId2"/>
+          <a:stretch>
+            <a:fillRect/>
+          </a:stretch>
+        </p:blipFill>
+        <p:spPr>
+          <a:xfrm>
+            <a:off x="4546122" y="2538592"/>
+            <a:ext cx="7293136" cy="3272686"/>
+          </a:xfrm>
+          <a:prstGeom prst="rect">
+            <a:avLst/>
+          </a:prstGeom>
+        </p:spPr>
+      </p:pic>
+      <p:pic>
+        <p:nvPicPr>
+          <p:cNvPr id="9" name="Picture 8"/>
+          <p:cNvPicPr>
+            <a:picLocks noChangeAspect="1"/>
+          </p:cNvPicPr>
+          <p:nvPr/>
+        </p:nvPicPr>
+        <p:blipFill>
+          <a:blip r:embed="rId3"/>
+          <a:stretch>
+            <a:fillRect/>
+          </a:stretch>
+        </p:blipFill>
+        <p:spPr>
+          <a:xfrm>
+            <a:off x="257803" y="2627142"/>
+            <a:ext cx="3184136" cy="3184136"/>
+          </a:xfrm>
+          <a:prstGeom prst="rect">
+            <a:avLst/>
+          </a:prstGeom>
+        </p:spPr>
+      </p:pic>
+    </p:spTree>
+    <p:extLst>
+      <p:ext uri="{BB962C8B-B14F-4D97-AF65-F5344CB8AC3E}">
+        <p14:creationId xmlns:p14="http://schemas.microsoft.com/office/powerpoint/2010/main" val="1508320118"/>
+      </p:ext>
+    </p:extLst>
+  </p:cSld>
+  <p:clrMapOvr>
+    <a:masterClrMapping/>
+  </p:clrMapOvr>
+  <p:timing>
+    <p:tnLst>
+      <p:par>
+        <p:cTn id="1" dur="indefinite" restart="never" nodeType="tmRoot"/>
+      </p:par>
+    </p:tnLst>
+  </p:timing>
+</p:sld>
+</file>
+
+<file path=ppt/slides/slide14.xml><?xml version="1.0" encoding="utf-8"?>
+<p:sld xmlns:a="http://schemas.openxmlformats.org/drawingml/2006/main" xmlns:r="http://schemas.openxmlformats.org/officeDocument/2006/relationships" xmlns:p="http://schemas.openxmlformats.org/presentationml/2006/main">
+  <p:cSld>
+    <p:spTree>
+      <p:nvGrpSpPr>
+        <p:cNvPr id="1" name=""/>
+        <p:cNvGrpSpPr/>
+        <p:nvPr/>
+      </p:nvGrpSpPr>
+      <p:grpSpPr>
+        <a:xfrm>
+          <a:off x="0" y="0"/>
+          <a:ext cx="0" cy="0"/>
+          <a:chOff x="0" y="0"/>
+          <a:chExt cx="0" cy="0"/>
+        </a:xfrm>
+      </p:grpSpPr>
+      <p:sp>
+        <p:nvSpPr>
+          <p:cNvPr id="2" name="Title 1"/>
+          <p:cNvSpPr>
+            <a:spLocks noGrp="1"/>
+          </p:cNvSpPr>
+          <p:nvPr>
+            <p:ph type="title"/>
+          </p:nvPr>
+        </p:nvSpPr>
+        <p:spPr/>
+        <p:txBody>
+          <a:bodyPr/>
+          <a:lstStyle/>
+          <a:p>
+            <a:r>
+              <a:rPr lang="en-US" dirty="0" smtClean="0"/>
+              <a:t>Summary</a:t>
+            </a:r>
+            <a:endParaRPr lang="en-US" dirty="0"/>
+          </a:p>
+        </p:txBody>
+      </p:sp>
+      <p:sp>
+        <p:nvSpPr>
+          <p:cNvPr id="6" name="TextBox 5"/>
+          <p:cNvSpPr txBox="1"/>
+          <p:nvPr/>
+        </p:nvSpPr>
+        <p:spPr>
+          <a:xfrm>
+            <a:off x="4166559" y="2474865"/>
+            <a:ext cx="7142326" cy="3139321"/>
+          </a:xfrm>
+          <a:prstGeom prst="rect">
+            <a:avLst/>
+          </a:prstGeom>
+          <a:noFill/>
+        </p:spPr>
+        <p:txBody>
+          <a:bodyPr wrap="square" rtlCol="0">
+            <a:spAutoFit/>
+          </a:bodyPr>
+          <a:lstStyle/>
+          <a:p>
+            <a:pPr marL="285750" indent="-285750">
+              <a:buFont typeface="Arial" panose="020B0604020202020204" pitchFamily="34" charset="0"/>
+              <a:buChar char="•"/>
+            </a:pPr>
+            <a:r>
+              <a:rPr lang="en-US" dirty="0" smtClean="0"/>
+              <a:t>Success!</a:t>
+            </a:r>
+          </a:p>
+          <a:p>
+            <a:pPr marL="285750" indent="-285750">
+              <a:buFont typeface="Arial" panose="020B0604020202020204" pitchFamily="34" charset="0"/>
+              <a:buChar char="•"/>
+            </a:pPr>
+            <a:endParaRPr lang="en-US" dirty="0"/>
+          </a:p>
+          <a:p>
+            <a:pPr marL="285750" indent="-285750">
+              <a:buFont typeface="Arial" panose="020B0604020202020204" pitchFamily="34" charset="0"/>
+              <a:buChar char="•"/>
+            </a:pPr>
+            <a:r>
+              <a:rPr lang="en-US" dirty="0" smtClean="0"/>
+              <a:t>Improved image quality of the original proposed method</a:t>
+            </a:r>
+          </a:p>
+          <a:p>
+            <a:pPr marL="285750" indent="-285750">
+              <a:buFont typeface="Arial" panose="020B0604020202020204" pitchFamily="34" charset="0"/>
+              <a:buChar char="•"/>
+            </a:pPr>
+            <a:endParaRPr lang="en-US" dirty="0"/>
+          </a:p>
+          <a:p>
+            <a:pPr marL="285750" indent="-285750">
+              <a:buFont typeface="Arial" panose="020B0604020202020204" pitchFamily="34" charset="0"/>
+              <a:buChar char="•"/>
+            </a:pPr>
+            <a:r>
+              <a:rPr lang="en-US" dirty="0" smtClean="0"/>
+              <a:t>Improved workflow</a:t>
+            </a:r>
+          </a:p>
+          <a:p>
+            <a:pPr marL="285750" indent="-285750">
+              <a:buFont typeface="Arial" panose="020B0604020202020204" pitchFamily="34" charset="0"/>
+              <a:buChar char="•"/>
+            </a:pPr>
+            <a:endParaRPr lang="en-US" dirty="0"/>
+          </a:p>
+          <a:p>
+            <a:pPr marL="285750" indent="-285750">
+              <a:buFont typeface="Arial" panose="020B0604020202020204" pitchFamily="34" charset="0"/>
+              <a:buChar char="•"/>
+            </a:pPr>
+            <a:r>
+              <a:rPr lang="en-US" dirty="0" smtClean="0"/>
+              <a:t>Works well defined concrete structures</a:t>
+            </a:r>
+          </a:p>
+          <a:p>
+            <a:pPr marL="285750" indent="-285750">
+              <a:buFont typeface="Arial" panose="020B0604020202020204" pitchFamily="34" charset="0"/>
+              <a:buChar char="•"/>
+            </a:pPr>
+            <a:endParaRPr lang="en-US" dirty="0"/>
+          </a:p>
+          <a:p>
+            <a:pPr marL="285750" indent="-285750">
+              <a:buFont typeface="Arial" panose="020B0604020202020204" pitchFamily="34" charset="0"/>
+              <a:buChar char="•"/>
+            </a:pPr>
+            <a:r>
+              <a:rPr lang="en-US" dirty="0" smtClean="0"/>
+              <a:t>Doesn’t Take too long to process</a:t>
+            </a:r>
+          </a:p>
+          <a:p>
+            <a:pPr marL="285750" indent="-285750">
+              <a:buFont typeface="Arial" panose="020B0604020202020204" pitchFamily="34" charset="0"/>
+              <a:buChar char="•"/>
+            </a:pPr>
+            <a:endParaRPr lang="en-US" dirty="0"/>
+          </a:p>
+          <a:p>
+            <a:pPr marL="285750" indent="-285750">
+              <a:buFont typeface="Arial" panose="020B0604020202020204" pitchFamily="34" charset="0"/>
+              <a:buChar char="•"/>
+            </a:pPr>
+            <a:r>
+              <a:rPr lang="en-US" dirty="0" smtClean="0"/>
+              <a:t>Comparable to the Canny edge detection method</a:t>
+            </a:r>
+          </a:p>
+        </p:txBody>
+      </p:sp>
+      <p:sp>
+        <p:nvSpPr>
+          <p:cNvPr id="5" name="Content Placeholder 2"/>
+          <p:cNvSpPr>
+            <a:spLocks noGrp="1"/>
+          </p:cNvSpPr>
+          <p:nvPr>
+            <p:ph sz="half" idx="1"/>
+          </p:nvPr>
+        </p:nvSpPr>
+        <p:spPr>
+          <a:xfrm>
+            <a:off x="581193" y="2228003"/>
+            <a:ext cx="2688218" cy="4276314"/>
+          </a:xfrm>
+          <a:solidFill>
+            <a:schemeClr val="accent2">
+              <a:lumMod val="60000"/>
+              <a:lumOff val="40000"/>
+            </a:schemeClr>
+          </a:solidFill>
+        </p:spPr>
+        <p:txBody>
+          <a:bodyPr>
+            <a:normAutofit/>
+          </a:bodyPr>
+          <a:lstStyle/>
+          <a:p>
+            <a:endParaRPr lang="en-US" dirty="0" smtClean="0"/>
+          </a:p>
+          <a:p>
+            <a:endParaRPr lang="en-US" dirty="0"/>
+          </a:p>
+          <a:p>
+            <a:r>
+              <a:rPr lang="en-US" dirty="0" smtClean="0"/>
+              <a:t>Desired Outcomes</a:t>
+            </a:r>
+          </a:p>
+          <a:p>
+            <a:r>
+              <a:rPr lang="en-US" dirty="0" smtClean="0"/>
+              <a:t>Related Methods</a:t>
+            </a:r>
+          </a:p>
+          <a:p>
+            <a:r>
+              <a:rPr lang="en-US" dirty="0" smtClean="0"/>
+              <a:t>Proposed Approach</a:t>
+            </a:r>
+          </a:p>
+          <a:p>
+            <a:r>
+              <a:rPr lang="en-US" dirty="0" smtClean="0"/>
+              <a:t>Shortcomings</a:t>
+            </a:r>
+          </a:p>
+          <a:p>
+            <a:r>
+              <a:rPr lang="en-US" dirty="0" smtClean="0"/>
+              <a:t>My Improvements</a:t>
+            </a:r>
+          </a:p>
+          <a:p>
+            <a:r>
+              <a:rPr lang="en-US" b="1" dirty="0" smtClean="0"/>
+              <a:t>Summary</a:t>
+            </a:r>
+          </a:p>
+          <a:p>
+            <a:r>
+              <a:rPr lang="en-US" dirty="0" smtClean="0"/>
+              <a:t>Future Work</a:t>
+            </a:r>
+          </a:p>
+          <a:p>
+            <a:endParaRPr lang="en-US" dirty="0" smtClean="0"/>
+          </a:p>
+          <a:p>
+            <a:endParaRPr lang="en-US" dirty="0"/>
+          </a:p>
+        </p:txBody>
+      </p:sp>
+    </p:spTree>
+    <p:extLst>
+      <p:ext uri="{BB962C8B-B14F-4D97-AF65-F5344CB8AC3E}">
+        <p14:creationId xmlns:p14="http://schemas.microsoft.com/office/powerpoint/2010/main" val="863086635"/>
+      </p:ext>
+    </p:extLst>
+  </p:cSld>
+  <p:clrMapOvr>
+    <a:masterClrMapping/>
+  </p:clrMapOvr>
+  <p:timing>
+    <p:tnLst>
+      <p:par>
+        <p:cTn id="1" dur="indefinite" restart="never" nodeType="tmRoot"/>
+      </p:par>
+    </p:tnLst>
+  </p:timing>
+</p:sld>
+</file>
+
+<file path=ppt/slides/slide15.xml><?xml version="1.0" encoding="utf-8"?>
+<p:sld xmlns:a="http://schemas.openxmlformats.org/drawingml/2006/main" xmlns:r="http://schemas.openxmlformats.org/officeDocument/2006/relationships" xmlns:p="http://schemas.openxmlformats.org/presentationml/2006/main">
+  <p:cSld>
+    <p:spTree>
+      <p:nvGrpSpPr>
+        <p:cNvPr id="1" name=""/>
+        <p:cNvGrpSpPr/>
+        <p:nvPr/>
+      </p:nvGrpSpPr>
+      <p:grpSpPr>
+        <a:xfrm>
+          <a:off x="0" y="0"/>
+          <a:ext cx="0" cy="0"/>
+          <a:chOff x="0" y="0"/>
+          <a:chExt cx="0" cy="0"/>
+        </a:xfrm>
+      </p:grpSpPr>
+      <p:sp>
+        <p:nvSpPr>
+          <p:cNvPr id="2" name="Title 1"/>
+          <p:cNvSpPr>
+            <a:spLocks noGrp="1"/>
+          </p:cNvSpPr>
+          <p:nvPr>
+            <p:ph type="title"/>
+          </p:nvPr>
+        </p:nvSpPr>
+        <p:spPr/>
+        <p:txBody>
+          <a:bodyPr/>
+          <a:lstStyle/>
+          <a:p>
+            <a:r>
+              <a:rPr lang="en-US" dirty="0" smtClean="0"/>
+              <a:t>Potential Future work</a:t>
+            </a:r>
+            <a:endParaRPr lang="en-US" dirty="0"/>
+          </a:p>
+        </p:txBody>
+      </p:sp>
+      <p:sp>
+        <p:nvSpPr>
+          <p:cNvPr id="6" name="TextBox 5"/>
+          <p:cNvSpPr txBox="1"/>
+          <p:nvPr/>
+        </p:nvSpPr>
+        <p:spPr>
+          <a:xfrm>
+            <a:off x="4721870" y="3028863"/>
+            <a:ext cx="7142326" cy="2308324"/>
+          </a:xfrm>
+          <a:prstGeom prst="rect">
+            <a:avLst/>
+          </a:prstGeom>
+          <a:noFill/>
+        </p:spPr>
+        <p:txBody>
+          <a:bodyPr wrap="square" rtlCol="0">
+            <a:spAutoFit/>
+          </a:bodyPr>
+          <a:lstStyle/>
+          <a:p>
+            <a:pPr marL="285750" indent="-285750">
+              <a:buFont typeface="Arial" panose="020B0604020202020204" pitchFamily="34" charset="0"/>
+              <a:buChar char="•"/>
+            </a:pPr>
+            <a:r>
+              <a:rPr lang="en-US" dirty="0" smtClean="0"/>
+              <a:t>Complete process in a more timely manner</a:t>
+            </a:r>
+          </a:p>
+          <a:p>
+            <a:pPr marL="285750" indent="-285750">
+              <a:buFont typeface="Arial" panose="020B0604020202020204" pitchFamily="34" charset="0"/>
+              <a:buChar char="•"/>
+            </a:pPr>
+            <a:endParaRPr lang="en-US" dirty="0" smtClean="0"/>
+          </a:p>
+          <a:p>
+            <a:pPr marL="285750" indent="-285750">
+              <a:buFont typeface="Arial" panose="020B0604020202020204" pitchFamily="34" charset="0"/>
+              <a:buChar char="•"/>
+            </a:pPr>
+            <a:endParaRPr lang="en-US" dirty="0"/>
+          </a:p>
+          <a:p>
+            <a:pPr marL="285750" indent="-285750">
+              <a:buFont typeface="Arial" panose="020B0604020202020204" pitchFamily="34" charset="0"/>
+              <a:buChar char="•"/>
+            </a:pPr>
+            <a:r>
+              <a:rPr lang="en-US" dirty="0" smtClean="0"/>
+              <a:t>Continue to improve the system for concrete structures</a:t>
+            </a:r>
+          </a:p>
+          <a:p>
+            <a:pPr marL="742950" lvl="1" indent="-285750">
+              <a:buFont typeface="Arial" panose="020B0604020202020204" pitchFamily="34" charset="0"/>
+              <a:buChar char="•"/>
+            </a:pPr>
+            <a:r>
+              <a:rPr lang="en-US" dirty="0" smtClean="0"/>
+              <a:t>Handle obstructions better</a:t>
+            </a:r>
+          </a:p>
+          <a:p>
+            <a:pPr marL="742950" lvl="1" indent="-285750">
+              <a:buFont typeface="Arial" panose="020B0604020202020204" pitchFamily="34" charset="0"/>
+              <a:buChar char="•"/>
+            </a:pPr>
+            <a:r>
+              <a:rPr lang="en-US" dirty="0" smtClean="0"/>
+              <a:t>Handle discontinuities better</a:t>
+            </a:r>
+          </a:p>
+          <a:p>
+            <a:pPr marL="742950" lvl="1" indent="-285750">
+              <a:buFont typeface="Arial" panose="020B0604020202020204" pitchFamily="34" charset="0"/>
+              <a:buChar char="•"/>
+            </a:pPr>
+            <a:endParaRPr lang="en-US" dirty="0"/>
+          </a:p>
+          <a:p>
+            <a:pPr marL="285750" indent="-285750">
+              <a:buFont typeface="Arial" panose="020B0604020202020204" pitchFamily="34" charset="0"/>
+              <a:buChar char="•"/>
+            </a:pPr>
+            <a:endParaRPr lang="en-US" dirty="0" smtClean="0"/>
+          </a:p>
+        </p:txBody>
+      </p:sp>
+      <p:sp>
+        <p:nvSpPr>
+          <p:cNvPr id="5" name="Content Placeholder 2"/>
+          <p:cNvSpPr>
+            <a:spLocks noGrp="1"/>
+          </p:cNvSpPr>
+          <p:nvPr>
+            <p:ph sz="half" idx="1"/>
+          </p:nvPr>
+        </p:nvSpPr>
+        <p:spPr>
+          <a:xfrm>
+            <a:off x="581193" y="2228003"/>
+            <a:ext cx="2688218" cy="4276314"/>
+          </a:xfrm>
+          <a:solidFill>
+            <a:schemeClr val="accent2">
+              <a:lumMod val="60000"/>
+              <a:lumOff val="40000"/>
+            </a:schemeClr>
+          </a:solidFill>
+        </p:spPr>
+        <p:txBody>
+          <a:bodyPr>
+            <a:normAutofit/>
+          </a:bodyPr>
+          <a:lstStyle/>
+          <a:p>
+            <a:endParaRPr lang="en-US" dirty="0" smtClean="0"/>
+          </a:p>
+          <a:p>
+            <a:endParaRPr lang="en-US" dirty="0"/>
+          </a:p>
+          <a:p>
+            <a:r>
+              <a:rPr lang="en-US" dirty="0" smtClean="0"/>
+              <a:t>Desired Outcomes</a:t>
+            </a:r>
+          </a:p>
+          <a:p>
+            <a:r>
+              <a:rPr lang="en-US" dirty="0" smtClean="0"/>
+              <a:t>Related Methods</a:t>
+            </a:r>
+          </a:p>
+          <a:p>
+            <a:r>
+              <a:rPr lang="en-US" dirty="0" smtClean="0"/>
+              <a:t>Proposed Approach</a:t>
+            </a:r>
+          </a:p>
+          <a:p>
+            <a:r>
+              <a:rPr lang="en-US" dirty="0" smtClean="0"/>
+              <a:t>Shortcomings</a:t>
+            </a:r>
+          </a:p>
+          <a:p>
+            <a:r>
+              <a:rPr lang="en-US" dirty="0" smtClean="0"/>
+              <a:t>My Improvements</a:t>
+            </a:r>
+          </a:p>
+          <a:p>
+            <a:r>
+              <a:rPr lang="en-US" dirty="0" smtClean="0"/>
+              <a:t>Summary</a:t>
+            </a:r>
+          </a:p>
+          <a:p>
+            <a:r>
+              <a:rPr lang="en-US" b="1" dirty="0" smtClean="0"/>
+              <a:t>Future Work</a:t>
+            </a:r>
+          </a:p>
+          <a:p>
+            <a:endParaRPr lang="en-US" dirty="0" smtClean="0"/>
+          </a:p>
+          <a:p>
+            <a:endParaRPr lang="en-US" dirty="0"/>
+          </a:p>
+        </p:txBody>
+      </p:sp>
+    </p:spTree>
+    <p:extLst>
+      <p:ext uri="{BB962C8B-B14F-4D97-AF65-F5344CB8AC3E}">
+        <p14:creationId xmlns:p14="http://schemas.microsoft.com/office/powerpoint/2010/main" val="1499345646"/>
       </p:ext>
     </p:extLst>
   </p:cSld>
@@ -4021,12 +5049,71 @@
         <p:spPr>
           <a:xfrm>
             <a:off x="581193" y="2228003"/>
-            <a:ext cx="2688218" cy="3633047"/>
-          </a:xfrm>
-        </p:spPr>
-        <p:txBody>
-          <a:bodyPr/>
-          <a:lstStyle/>
+            <a:ext cx="2688218" cy="4276314"/>
+          </a:xfrm>
+          <a:solidFill>
+            <a:schemeClr val="accent2">
+              <a:lumMod val="60000"/>
+              <a:lumOff val="40000"/>
+            </a:schemeClr>
+          </a:solidFill>
+        </p:spPr>
+        <p:txBody>
+          <a:bodyPr>
+            <a:normAutofit/>
+          </a:bodyPr>
+          <a:lstStyle/>
+          <a:p>
+            <a:endParaRPr lang="en-US" dirty="0" smtClean="0"/>
+          </a:p>
+          <a:p>
+            <a:endParaRPr lang="en-US" dirty="0"/>
+          </a:p>
+          <a:p>
+            <a:r>
+              <a:rPr lang="en-US" b="1" dirty="0" smtClean="0"/>
+              <a:t>Desired Outcomes</a:t>
+            </a:r>
+          </a:p>
+          <a:p>
+            <a:r>
+              <a:rPr lang="en-US" dirty="0" smtClean="0"/>
+              <a:t>Related Methods</a:t>
+            </a:r>
+          </a:p>
+          <a:p>
+            <a:r>
+              <a:rPr lang="en-US" dirty="0" smtClean="0"/>
+              <a:t>Proposed Approach</a:t>
+            </a:r>
+          </a:p>
+          <a:p>
+            <a:r>
+              <a:rPr lang="en-US" dirty="0" smtClean="0"/>
+              <a:t>Shortcomings</a:t>
+            </a:r>
+          </a:p>
+          <a:p>
+            <a:r>
+              <a:rPr lang="en-US" dirty="0" smtClean="0"/>
+              <a:t>My Improvements</a:t>
+            </a:r>
+          </a:p>
+          <a:p>
+            <a:r>
+              <a:rPr lang="en-US" dirty="0" smtClean="0"/>
+              <a:t>Summary</a:t>
+            </a:r>
+          </a:p>
+          <a:p>
+            <a:r>
+              <a:rPr lang="en-US" dirty="0" smtClean="0"/>
+              <a:t>Future Work</a:t>
+            </a:r>
+          </a:p>
+          <a:p>
+            <a:endParaRPr lang="en-US" dirty="0" smtClean="0"/>
+          </a:p>
           <a:p>
             <a:endParaRPr lang="en-US" dirty="0"/>
           </a:p>
@@ -4151,6 +5238,13 @@
   <p:clrMapOvr>
     <a:masterClrMapping/>
   </p:clrMapOvr>
+  <p:timing>
+    <p:tnLst>
+      <p:par>
+        <p:cTn id="1" dur="indefinite" restart="never" nodeType="tmRoot"/>
+      </p:par>
+    </p:tnLst>
+  </p:timing>
 </p:sld>
 </file>
 
@@ -4196,30 +5290,6 @@
       </p:sp>
       <p:sp>
         <p:nvSpPr>
-          <p:cNvPr id="3" name="Content Placeholder 2"/>
-          <p:cNvSpPr>
-            <a:spLocks noGrp="1"/>
-          </p:cNvSpPr>
-          <p:nvPr>
-            <p:ph sz="half" idx="1"/>
-          </p:nvPr>
-        </p:nvSpPr>
-        <p:spPr>
-          <a:xfrm>
-            <a:off x="581193" y="2228003"/>
-            <a:ext cx="2688218" cy="3633047"/>
-          </a:xfrm>
-        </p:spPr>
-        <p:txBody>
-          <a:bodyPr/>
-          <a:lstStyle/>
-          <a:p>
-            <a:endParaRPr lang="en-US" dirty="0"/>
-          </a:p>
-        </p:txBody>
-      </p:sp>
-      <p:sp>
-        <p:nvSpPr>
           <p:cNvPr id="6" name="TextBox 5"/>
           <p:cNvSpPr txBox="1"/>
           <p:nvPr/>
@@ -4306,6 +5376,89 @@
               <a:rPr lang="en-US" b="1" dirty="0" smtClean="0"/>
               <a:t>similarity detection</a:t>
             </a:r>
+          </a:p>
+        </p:txBody>
+      </p:sp>
+      <p:sp>
+        <p:nvSpPr>
+          <p:cNvPr id="9" name="Content Placeholder 2"/>
+          <p:cNvSpPr>
+            <a:spLocks noGrp="1"/>
+          </p:cNvSpPr>
+          <p:nvPr>
+            <p:ph sz="half" idx="1"/>
+          </p:nvPr>
+        </p:nvSpPr>
+        <p:spPr>
+          <a:xfrm>
+            <a:off x="581193" y="2228003"/>
+            <a:ext cx="2688218" cy="4276314"/>
+          </a:xfrm>
+          <a:solidFill>
+            <a:schemeClr val="accent2">
+              <a:lumMod val="60000"/>
+              <a:lumOff val="40000"/>
+            </a:schemeClr>
+          </a:solidFill>
+        </p:spPr>
+        <p:txBody>
+          <a:bodyPr>
+            <a:normAutofit/>
+          </a:bodyPr>
+          <a:lstStyle/>
+          <a:p>
+            <a:endParaRPr lang="en-US" dirty="0" smtClean="0"/>
+          </a:p>
+          <a:p>
+            <a:endParaRPr lang="en-US" dirty="0"/>
+          </a:p>
+          <a:p>
+            <a:r>
+              <a:rPr lang="en-US" dirty="0" smtClean="0"/>
+              <a:t>Desired Outcomes</a:t>
+            </a:r>
+          </a:p>
+          <a:p>
+            <a:r>
+              <a:rPr lang="en-US" b="1" dirty="0" smtClean="0"/>
+              <a:t>Related Methods</a:t>
+            </a:r>
+          </a:p>
+          <a:p>
+            <a:r>
+              <a:rPr lang="en-US" dirty="0" smtClean="0"/>
+              <a:t>Proposed Approach</a:t>
+            </a:r>
+          </a:p>
+          <a:p>
+            <a:r>
+              <a:rPr lang="en-US" dirty="0" smtClean="0"/>
+              <a:t>Shortcomings</a:t>
+            </a:r>
+          </a:p>
+          <a:p>
+            <a:r>
+              <a:rPr lang="en-US" dirty="0" smtClean="0"/>
+              <a:t>My Improvements</a:t>
+            </a:r>
+          </a:p>
+          <a:p>
+            <a:r>
+              <a:rPr lang="en-US" dirty="0" smtClean="0"/>
+              <a:t>Summary</a:t>
+            </a:r>
+          </a:p>
+          <a:p>
+            <a:r>
+              <a:rPr lang="en-US" dirty="0" smtClean="0"/>
+              <a:t>Future Work</a:t>
+            </a:r>
+          </a:p>
+          <a:p>
+            <a:endParaRPr lang="en-US" dirty="0" smtClean="0"/>
+          </a:p>
+          <a:p>
+            <a:endParaRPr lang="en-US" dirty="0"/>
           </a:p>
         </p:txBody>
       </p:sp>
@@ -4319,6 +5472,13 @@
   <p:clrMapOvr>
     <a:masterClrMapping/>
   </p:clrMapOvr>
+  <p:timing>
+    <p:tnLst>
+      <p:par>
+        <p:cTn id="1" dur="indefinite" restart="never" nodeType="tmRoot"/>
+      </p:par>
+    </p:tnLst>
+  </p:timing>
 </p:sld>
 </file>
 
@@ -4356,37 +5516,9 @@
           <a:p>
             <a:r>
               <a:rPr lang="en-US" dirty="0" smtClean="0"/>
-              <a:t>The Proposed </a:t>
-            </a:r>
-            <a:r>
-              <a:rPr lang="en-US" dirty="0" smtClean="0"/>
-              <a:t>Approach</a:t>
-            </a:r>
-            <a:endParaRPr lang="en-US" dirty="0"/>
-          </a:p>
-        </p:txBody>
-      </p:sp>
-      <p:sp>
-        <p:nvSpPr>
-          <p:cNvPr id="5" name="Content Placeholder 4"/>
-          <p:cNvSpPr>
-            <a:spLocks noGrp="1"/>
-          </p:cNvSpPr>
-          <p:nvPr>
-            <p:ph sz="half" idx="1"/>
-          </p:nvPr>
-        </p:nvSpPr>
-        <p:spPr>
-          <a:xfrm>
-            <a:off x="580791" y="2228003"/>
-            <a:ext cx="2231420" cy="3633047"/>
-          </a:xfrm>
-        </p:spPr>
-        <p:txBody>
-          <a:bodyPr/>
-          <a:lstStyle/>
-          <a:p>
-            <a:endParaRPr lang="en-US"/>
+              <a:t>The Proposed Approach</a:t>
+            </a:r>
+            <a:endParaRPr lang="en-US" dirty="0"/>
           </a:p>
         </p:txBody>
       </p:sp>
@@ -4475,6 +5607,89 @@
               <a:rPr lang="en-US" dirty="0" smtClean="0"/>
               <a:t>Authors state that this method reduces the amount of noise.</a:t>
             </a:r>
+            <a:endParaRPr lang="en-US" dirty="0"/>
+          </a:p>
+        </p:txBody>
+      </p:sp>
+      <p:sp>
+        <p:nvSpPr>
+          <p:cNvPr id="10" name="Content Placeholder 2"/>
+          <p:cNvSpPr>
+            <a:spLocks noGrp="1"/>
+          </p:cNvSpPr>
+          <p:nvPr>
+            <p:ph sz="half" idx="1"/>
+          </p:nvPr>
+        </p:nvSpPr>
+        <p:spPr>
+          <a:xfrm>
+            <a:off x="581193" y="2261131"/>
+            <a:ext cx="2688218" cy="4276314"/>
+          </a:xfrm>
+          <a:solidFill>
+            <a:schemeClr val="accent2">
+              <a:lumMod val="60000"/>
+              <a:lumOff val="40000"/>
+            </a:schemeClr>
+          </a:solidFill>
+        </p:spPr>
+        <p:txBody>
+          <a:bodyPr>
+            <a:normAutofit/>
+          </a:bodyPr>
+          <a:lstStyle/>
+          <a:p>
+            <a:endParaRPr lang="en-US" dirty="0" smtClean="0"/>
+          </a:p>
+          <a:p>
+            <a:endParaRPr lang="en-US" dirty="0"/>
+          </a:p>
+          <a:p>
+            <a:r>
+              <a:rPr lang="en-US" dirty="0" smtClean="0"/>
+              <a:t>Desired Outcomes</a:t>
+            </a:r>
+          </a:p>
+          <a:p>
+            <a:r>
+              <a:rPr lang="en-US" dirty="0" smtClean="0"/>
+              <a:t>Related Methods</a:t>
+            </a:r>
+          </a:p>
+          <a:p>
+            <a:r>
+              <a:rPr lang="en-US" b="1" dirty="0" smtClean="0"/>
+              <a:t>Proposed Approach</a:t>
+            </a:r>
+          </a:p>
+          <a:p>
+            <a:r>
+              <a:rPr lang="en-US" dirty="0" smtClean="0"/>
+              <a:t>Shortcomings</a:t>
+            </a:r>
+          </a:p>
+          <a:p>
+            <a:r>
+              <a:rPr lang="en-US" dirty="0" smtClean="0"/>
+              <a:t>My Improvements</a:t>
+            </a:r>
+          </a:p>
+          <a:p>
+            <a:r>
+              <a:rPr lang="en-US" dirty="0" smtClean="0"/>
+              <a:t>Summary</a:t>
+            </a:r>
+          </a:p>
+          <a:p>
+            <a:r>
+              <a:rPr lang="en-US" dirty="0" smtClean="0"/>
+              <a:t>Future Work</a:t>
+            </a:r>
+          </a:p>
+          <a:p>
+            <a:endParaRPr lang="en-US" dirty="0" smtClean="0"/>
+          </a:p>
+          <a:p>
             <a:endParaRPr lang="en-US" dirty="0"/>
           </a:p>
         </p:txBody>
@@ -4533,7 +5748,11 @@
           <a:p>
             <a:r>
               <a:rPr lang="en-US" dirty="0" smtClean="0"/>
-              <a:t>Generic Method Comparison</a:t>
+              <a:t>Method </a:t>
+            </a:r>
+            <a:r>
+              <a:rPr lang="en-US" dirty="0" smtClean="0"/>
+              <a:t>Comparison</a:t>
             </a:r>
             <a:endParaRPr lang="en-US" dirty="0"/>
           </a:p>
@@ -4541,7 +5760,7 @@
       </p:sp>
       <p:pic>
         <p:nvPicPr>
-          <p:cNvPr id="10" name="Picture 9"/>
+          <p:cNvPr id="2" name="Picture 1"/>
           <p:cNvPicPr>
             <a:picLocks noChangeAspect="1"/>
           </p:cNvPicPr>
@@ -4555,8 +5774,8 @@
         </p:blipFill>
         <p:spPr>
           <a:xfrm>
-            <a:off x="332662" y="2897984"/>
-            <a:ext cx="11526678" cy="2544453"/>
+            <a:off x="930163" y="2777612"/>
+            <a:ext cx="10331676" cy="3027421"/>
           </a:xfrm>
           <a:prstGeom prst="rect">
             <a:avLst/>
@@ -4602,7 +5821,7 @@
       </p:grpSpPr>
       <p:sp>
         <p:nvSpPr>
-          <p:cNvPr id="4" name="Title 3"/>
+          <p:cNvPr id="2" name="Title 1"/>
           <p:cNvSpPr>
             <a:spLocks noGrp="1"/>
           </p:cNvSpPr>
@@ -4617,15 +5836,77 @@
           <a:p>
             <a:r>
               <a:rPr lang="en-US" dirty="0" smtClean="0"/>
-              <a:t>Generic Method Comparison</a:t>
-            </a:r>
-            <a:endParaRPr lang="en-US" dirty="0"/>
+              <a:t>Shortcomings of Proposed Method</a:t>
+            </a:r>
+            <a:endParaRPr lang="en-US" dirty="0"/>
+          </a:p>
+        </p:txBody>
+      </p:sp>
+      <p:sp>
+        <p:nvSpPr>
+          <p:cNvPr id="6" name="TextBox 5"/>
+          <p:cNvSpPr txBox="1"/>
+          <p:nvPr/>
+        </p:nvSpPr>
+        <p:spPr>
+          <a:xfrm>
+            <a:off x="3778369" y="2230391"/>
+            <a:ext cx="7832440" cy="1477328"/>
+          </a:xfrm>
+          <a:prstGeom prst="rect">
+            <a:avLst/>
+          </a:prstGeom>
+          <a:noFill/>
+        </p:spPr>
+        <p:txBody>
+          <a:bodyPr wrap="square" rtlCol="0">
+            <a:spAutoFit/>
+          </a:bodyPr>
+          <a:lstStyle/>
+          <a:p>
+            <a:pPr marL="285750" indent="-285750">
+              <a:buFont typeface="Arial" panose="020B0604020202020204" pitchFamily="34" charset="0"/>
+              <a:buChar char="•"/>
+            </a:pPr>
+            <a:r>
+              <a:rPr lang="en-US" dirty="0" smtClean="0"/>
+              <a:t>Can produce noisy results (depending on the scenario)</a:t>
+            </a:r>
+            <a:endParaRPr lang="en-US" dirty="0" smtClean="0"/>
+          </a:p>
+          <a:p>
+            <a:endParaRPr lang="en-US" dirty="0" smtClean="0"/>
+          </a:p>
+          <a:p>
+            <a:pPr marL="285750" indent="-285750">
+              <a:buFont typeface="Arial" panose="020B0604020202020204" pitchFamily="34" charset="0"/>
+              <a:buChar char="•"/>
+            </a:pPr>
+            <a:r>
+              <a:rPr lang="en-US" dirty="0" smtClean="0"/>
+              <a:t>Documented workflow is messy</a:t>
+            </a:r>
+            <a:endParaRPr lang="en-US" b="1" dirty="0" smtClean="0"/>
+          </a:p>
+          <a:p>
+            <a:endParaRPr lang="en-US" dirty="0" smtClean="0"/>
+          </a:p>
+          <a:p>
+            <a:pPr marL="285750" indent="-285750">
+              <a:buFont typeface="Arial" panose="020B0604020202020204" pitchFamily="34" charset="0"/>
+              <a:buChar char="•"/>
+            </a:pPr>
+            <a:r>
+              <a:rPr lang="en-US" dirty="0" smtClean="0"/>
+              <a:t>Image segmentation isn’t always accurate</a:t>
+            </a:r>
+            <a:endParaRPr lang="en-US" b="1" dirty="0" smtClean="0"/>
           </a:p>
         </p:txBody>
       </p:sp>
       <p:pic>
         <p:nvPicPr>
-          <p:cNvPr id="2" name="Picture 1"/>
+          <p:cNvPr id="5" name="Picture 4"/>
           <p:cNvPicPr>
             <a:picLocks noChangeAspect="1"/>
           </p:cNvPicPr>
@@ -4639,8 +5920,8 @@
         </p:blipFill>
         <p:spPr>
           <a:xfrm>
-            <a:off x="1831365" y="2195934"/>
-            <a:ext cx="8529271" cy="2979015"/>
+            <a:off x="3628126" y="3895665"/>
+            <a:ext cx="7982683" cy="2731757"/>
           </a:xfrm>
           <a:prstGeom prst="rect">
             <a:avLst/>
@@ -4649,14 +5930,348 @@
       </p:pic>
       <p:sp>
         <p:nvSpPr>
-          <p:cNvPr id="3" name="TextBox 2"/>
+          <p:cNvPr id="7" name="Content Placeholder 2"/>
+          <p:cNvSpPr>
+            <a:spLocks noGrp="1"/>
+          </p:cNvSpPr>
+          <p:nvPr>
+            <p:ph sz="half" idx="1"/>
+          </p:nvPr>
+        </p:nvSpPr>
+        <p:spPr>
+          <a:xfrm>
+            <a:off x="581193" y="2228003"/>
+            <a:ext cx="2688218" cy="4276314"/>
+          </a:xfrm>
+          <a:solidFill>
+            <a:schemeClr val="accent2">
+              <a:lumMod val="60000"/>
+              <a:lumOff val="40000"/>
+            </a:schemeClr>
+          </a:solidFill>
+        </p:spPr>
+        <p:txBody>
+          <a:bodyPr>
+            <a:normAutofit/>
+          </a:bodyPr>
+          <a:lstStyle/>
+          <a:p>
+            <a:endParaRPr lang="en-US" dirty="0" smtClean="0"/>
+          </a:p>
+          <a:p>
+            <a:endParaRPr lang="en-US" dirty="0"/>
+          </a:p>
+          <a:p>
+            <a:r>
+              <a:rPr lang="en-US" dirty="0" smtClean="0"/>
+              <a:t>Desired Outcomes</a:t>
+            </a:r>
+          </a:p>
+          <a:p>
+            <a:r>
+              <a:rPr lang="en-US" dirty="0" smtClean="0"/>
+              <a:t>Related Methods</a:t>
+            </a:r>
+          </a:p>
+          <a:p>
+            <a:r>
+              <a:rPr lang="en-US" dirty="0" smtClean="0"/>
+              <a:t>Proposed Approach</a:t>
+            </a:r>
+          </a:p>
+          <a:p>
+            <a:r>
+              <a:rPr lang="en-US" b="1" dirty="0" smtClean="0"/>
+              <a:t>Shortcomings</a:t>
+            </a:r>
+          </a:p>
+          <a:p>
+            <a:r>
+              <a:rPr lang="en-US" dirty="0" smtClean="0"/>
+              <a:t>My Improvements</a:t>
+            </a:r>
+          </a:p>
+          <a:p>
+            <a:r>
+              <a:rPr lang="en-US" dirty="0" smtClean="0"/>
+              <a:t>Summary</a:t>
+            </a:r>
+          </a:p>
+          <a:p>
+            <a:r>
+              <a:rPr lang="en-US" dirty="0" smtClean="0"/>
+              <a:t>Future Work</a:t>
+            </a:r>
+          </a:p>
+          <a:p>
+            <a:endParaRPr lang="en-US" dirty="0" smtClean="0"/>
+          </a:p>
+          <a:p>
+            <a:endParaRPr lang="en-US" dirty="0"/>
+          </a:p>
+        </p:txBody>
+      </p:sp>
+    </p:spTree>
+    <p:extLst>
+      <p:ext uri="{BB962C8B-B14F-4D97-AF65-F5344CB8AC3E}">
+        <p14:creationId xmlns:p14="http://schemas.microsoft.com/office/powerpoint/2010/main" val="3512891571"/>
+      </p:ext>
+    </p:extLst>
+  </p:cSld>
+  <p:clrMapOvr>
+    <a:masterClrMapping/>
+  </p:clrMapOvr>
+  <p:timing>
+    <p:tnLst>
+      <p:par>
+        <p:cTn id="1" dur="indefinite" restart="never" nodeType="tmRoot"/>
+      </p:par>
+    </p:tnLst>
+  </p:timing>
+</p:sld>
+</file>
+
+<file path=ppt/slides/slide7.xml><?xml version="1.0" encoding="utf-8"?>
+<p:sld xmlns:a="http://schemas.openxmlformats.org/drawingml/2006/main" xmlns:r="http://schemas.openxmlformats.org/officeDocument/2006/relationships" xmlns:p="http://schemas.openxmlformats.org/presentationml/2006/main">
+  <p:cSld>
+    <p:spTree>
+      <p:nvGrpSpPr>
+        <p:cNvPr id="1" name=""/>
+        <p:cNvGrpSpPr/>
+        <p:nvPr/>
+      </p:nvGrpSpPr>
+      <p:grpSpPr>
+        <a:xfrm>
+          <a:off x="0" y="0"/>
+          <a:ext cx="0" cy="0"/>
+          <a:chOff x="0" y="0"/>
+          <a:chExt cx="0" cy="0"/>
+        </a:xfrm>
+      </p:grpSpPr>
+      <p:sp>
+        <p:nvSpPr>
+          <p:cNvPr id="2" name="Title 1"/>
+          <p:cNvSpPr>
+            <a:spLocks noGrp="1"/>
+          </p:cNvSpPr>
+          <p:nvPr>
+            <p:ph type="title"/>
+          </p:nvPr>
+        </p:nvSpPr>
+        <p:spPr/>
+        <p:txBody>
+          <a:bodyPr/>
+          <a:lstStyle/>
+          <a:p>
+            <a:r>
+              <a:rPr lang="en-US" dirty="0" smtClean="0"/>
+              <a:t>Shortcomings of Proposed Method (continued)</a:t>
+            </a:r>
+            <a:endParaRPr lang="en-US" dirty="0"/>
+          </a:p>
+        </p:txBody>
+      </p:sp>
+      <p:pic>
+        <p:nvPicPr>
+          <p:cNvPr id="4" name="Picture 3"/>
+          <p:cNvPicPr>
+            <a:picLocks noChangeAspect="1"/>
+          </p:cNvPicPr>
+          <p:nvPr/>
+        </p:nvPicPr>
+        <p:blipFill>
+          <a:blip r:embed="rId2"/>
+          <a:stretch>
+            <a:fillRect/>
+          </a:stretch>
+        </p:blipFill>
+        <p:spPr>
+          <a:xfrm>
+            <a:off x="4468482" y="1958939"/>
+            <a:ext cx="5686516" cy="1966082"/>
+          </a:xfrm>
+          <a:prstGeom prst="rect">
+            <a:avLst/>
+          </a:prstGeom>
+        </p:spPr>
+      </p:pic>
+      <p:pic>
+        <p:nvPicPr>
+          <p:cNvPr id="7" name="Picture 6"/>
+          <p:cNvPicPr>
+            <a:picLocks noChangeAspect="1"/>
+          </p:cNvPicPr>
+          <p:nvPr/>
+        </p:nvPicPr>
+        <p:blipFill>
+          <a:blip r:embed="rId3"/>
+          <a:stretch>
+            <a:fillRect/>
+          </a:stretch>
+        </p:blipFill>
+        <p:spPr>
+          <a:xfrm>
+            <a:off x="4468482" y="4088333"/>
+            <a:ext cx="5686516" cy="2540784"/>
+          </a:xfrm>
+          <a:prstGeom prst="rect">
+            <a:avLst/>
+          </a:prstGeom>
+        </p:spPr>
+      </p:pic>
+      <p:sp>
+        <p:nvSpPr>
+          <p:cNvPr id="8" name="Content Placeholder 2"/>
+          <p:cNvSpPr>
+            <a:spLocks noGrp="1"/>
+          </p:cNvSpPr>
+          <p:nvPr>
+            <p:ph sz="half" idx="1"/>
+          </p:nvPr>
+        </p:nvSpPr>
+        <p:spPr>
+          <a:xfrm>
+            <a:off x="581193" y="2228003"/>
+            <a:ext cx="2688218" cy="4276314"/>
+          </a:xfrm>
+          <a:solidFill>
+            <a:schemeClr val="accent2">
+              <a:lumMod val="60000"/>
+              <a:lumOff val="40000"/>
+            </a:schemeClr>
+          </a:solidFill>
+        </p:spPr>
+        <p:txBody>
+          <a:bodyPr>
+            <a:normAutofit/>
+          </a:bodyPr>
+          <a:lstStyle/>
+          <a:p>
+            <a:endParaRPr lang="en-US" dirty="0" smtClean="0"/>
+          </a:p>
+          <a:p>
+            <a:endParaRPr lang="en-US" dirty="0"/>
+          </a:p>
+          <a:p>
+            <a:r>
+              <a:rPr lang="en-US" dirty="0" smtClean="0"/>
+              <a:t>Desired Outcomes</a:t>
+            </a:r>
+          </a:p>
+          <a:p>
+            <a:r>
+              <a:rPr lang="en-US" dirty="0" smtClean="0"/>
+              <a:t>Related Methods</a:t>
+            </a:r>
+          </a:p>
+          <a:p>
+            <a:r>
+              <a:rPr lang="en-US" dirty="0" smtClean="0"/>
+              <a:t>Proposed Approach</a:t>
+            </a:r>
+          </a:p>
+          <a:p>
+            <a:r>
+              <a:rPr lang="en-US" b="1" dirty="0" smtClean="0"/>
+              <a:t>Shortcomings</a:t>
+            </a:r>
+          </a:p>
+          <a:p>
+            <a:r>
+              <a:rPr lang="en-US" dirty="0" smtClean="0"/>
+              <a:t>My Improvements</a:t>
+            </a:r>
+          </a:p>
+          <a:p>
+            <a:r>
+              <a:rPr lang="en-US" dirty="0" smtClean="0"/>
+              <a:t>Summary</a:t>
+            </a:r>
+          </a:p>
+          <a:p>
+            <a:r>
+              <a:rPr lang="en-US" dirty="0" smtClean="0"/>
+              <a:t>Future Work</a:t>
+            </a:r>
+          </a:p>
+          <a:p>
+            <a:endParaRPr lang="en-US" dirty="0" smtClean="0"/>
+          </a:p>
+          <a:p>
+            <a:endParaRPr lang="en-US" dirty="0"/>
+          </a:p>
+        </p:txBody>
+      </p:sp>
+    </p:spTree>
+    <p:extLst>
+      <p:ext uri="{BB962C8B-B14F-4D97-AF65-F5344CB8AC3E}">
+        <p14:creationId xmlns:p14="http://schemas.microsoft.com/office/powerpoint/2010/main" val="93181584"/>
+      </p:ext>
+    </p:extLst>
+  </p:cSld>
+  <p:clrMapOvr>
+    <a:masterClrMapping/>
+  </p:clrMapOvr>
+  <p:timing>
+    <p:tnLst>
+      <p:par>
+        <p:cTn id="1" dur="indefinite" restart="never" nodeType="tmRoot"/>
+      </p:par>
+    </p:tnLst>
+  </p:timing>
+</p:sld>
+</file>
+
+<file path=ppt/slides/slide8.xml><?xml version="1.0" encoding="utf-8"?>
+<p:sld xmlns:a="http://schemas.openxmlformats.org/drawingml/2006/main" xmlns:r="http://schemas.openxmlformats.org/officeDocument/2006/relationships" xmlns:p="http://schemas.openxmlformats.org/presentationml/2006/main">
+  <p:cSld>
+    <p:spTree>
+      <p:nvGrpSpPr>
+        <p:cNvPr id="1" name=""/>
+        <p:cNvGrpSpPr/>
+        <p:nvPr/>
+      </p:nvGrpSpPr>
+      <p:grpSpPr>
+        <a:xfrm>
+          <a:off x="0" y="0"/>
+          <a:ext cx="0" cy="0"/>
+          <a:chOff x="0" y="0"/>
+          <a:chExt cx="0" cy="0"/>
+        </a:xfrm>
+      </p:grpSpPr>
+      <p:sp>
+        <p:nvSpPr>
+          <p:cNvPr id="2" name="Title 1"/>
+          <p:cNvSpPr>
+            <a:spLocks noGrp="1"/>
+          </p:cNvSpPr>
+          <p:nvPr>
+            <p:ph type="title"/>
+          </p:nvPr>
+        </p:nvSpPr>
+        <p:spPr/>
+        <p:txBody>
+          <a:bodyPr/>
+          <a:lstStyle/>
+          <a:p>
+            <a:r>
+              <a:rPr lang="en-US" dirty="0" smtClean="0"/>
+              <a:t>My Improvements on the proposed approach</a:t>
+            </a:r>
+            <a:endParaRPr lang="en-US" dirty="0"/>
+          </a:p>
+        </p:txBody>
+      </p:sp>
+      <p:sp>
+        <p:nvSpPr>
+          <p:cNvPr id="6" name="TextBox 5"/>
           <p:cNvSpPr txBox="1"/>
           <p:nvPr/>
         </p:nvSpPr>
         <p:spPr>
           <a:xfrm>
-            <a:off x="3724806" y="5652893"/>
-            <a:ext cx="4742388" cy="369332"/>
+            <a:off x="4166559" y="2474865"/>
+            <a:ext cx="7142326" cy="4247317"/>
           </a:xfrm>
           <a:prstGeom prst="rect">
             <a:avLst/>
@@ -4664,15 +6279,224 @@
           <a:noFill/>
         </p:spPr>
         <p:txBody>
-          <a:bodyPr wrap="none" rtlCol="0">
+          <a:bodyPr wrap="square" rtlCol="0">
             <a:spAutoFit/>
           </a:bodyPr>
           <a:lstStyle/>
           <a:p>
-            <a:r>
-              <a:rPr lang="en-US" dirty="0" smtClean="0"/>
-              <a:t>Modified thresholds until entire crack was visible</a:t>
-            </a:r>
+            <a:pPr marL="285750" indent="-285750">
+              <a:buFont typeface="Arial" panose="020B0604020202020204" pitchFamily="34" charset="0"/>
+              <a:buChar char="•"/>
+            </a:pPr>
+            <a:r>
+              <a:rPr lang="en-US" dirty="0" smtClean="0"/>
+              <a:t>Instead of using a 3x3 mask, I used a 5x5 mask</a:t>
+            </a:r>
+          </a:p>
+          <a:p>
+            <a:pPr marL="285750" indent="-285750">
+              <a:buFont typeface="Arial" panose="020B0604020202020204" pitchFamily="34" charset="0"/>
+              <a:buChar char="•"/>
+            </a:pPr>
+            <a:endParaRPr lang="en-US" b="1" dirty="0"/>
+          </a:p>
+          <a:p>
+            <a:pPr marL="285750" indent="-285750">
+              <a:buFont typeface="Arial" panose="020B0604020202020204" pitchFamily="34" charset="0"/>
+              <a:buChar char="•"/>
+            </a:pPr>
+            <a:r>
+              <a:rPr lang="en-US" dirty="0" smtClean="0"/>
+              <a:t>Along with using a morphological thin function, I also implemented:</a:t>
+            </a:r>
+          </a:p>
+          <a:p>
+            <a:pPr marL="285750" indent="-285750">
+              <a:buFont typeface="Arial" panose="020B0604020202020204" pitchFamily="34" charset="0"/>
+              <a:buChar char="•"/>
+            </a:pPr>
+            <a:endParaRPr lang="en-US" dirty="0" smtClean="0"/>
+          </a:p>
+          <a:p>
+            <a:pPr marL="742950" lvl="1" indent="-285750">
+              <a:buFont typeface="Arial" panose="020B0604020202020204" pitchFamily="34" charset="0"/>
+              <a:buChar char="•"/>
+            </a:pPr>
+            <a:r>
+              <a:rPr lang="en-US" dirty="0" smtClean="0"/>
+              <a:t>Morphological clean function</a:t>
+            </a:r>
+          </a:p>
+          <a:p>
+            <a:pPr marL="742950" lvl="1" indent="-285750">
+              <a:buFont typeface="Arial" panose="020B0604020202020204" pitchFamily="34" charset="0"/>
+              <a:buChar char="•"/>
+            </a:pPr>
+            <a:endParaRPr lang="en-US" dirty="0" smtClean="0"/>
+          </a:p>
+          <a:p>
+            <a:pPr marL="742950" lvl="1" indent="-285750">
+              <a:buFont typeface="Arial" panose="020B0604020202020204" pitchFamily="34" charset="0"/>
+              <a:buChar char="•"/>
+            </a:pPr>
+            <a:r>
+              <a:rPr lang="en-US" dirty="0" smtClean="0"/>
+              <a:t>Morphologically eroded the image</a:t>
+            </a:r>
+          </a:p>
+          <a:p>
+            <a:pPr marL="742950" lvl="1" indent="-285750">
+              <a:buFont typeface="Arial" panose="020B0604020202020204" pitchFamily="34" charset="0"/>
+              <a:buChar char="•"/>
+            </a:pPr>
+            <a:endParaRPr lang="en-US" dirty="0" smtClean="0"/>
+          </a:p>
+          <a:p>
+            <a:pPr marL="742950" lvl="1" indent="-285750">
+              <a:buFont typeface="Arial" panose="020B0604020202020204" pitchFamily="34" charset="0"/>
+              <a:buChar char="•"/>
+            </a:pPr>
+            <a:r>
+              <a:rPr lang="en-US" dirty="0" smtClean="0"/>
+              <a:t>Morphologically dilated the image</a:t>
+            </a:r>
+          </a:p>
+          <a:p>
+            <a:pPr marL="742950" lvl="1" indent="-285750">
+              <a:buFont typeface="Arial" panose="020B0604020202020204" pitchFamily="34" charset="0"/>
+              <a:buChar char="•"/>
+            </a:pPr>
+            <a:endParaRPr lang="en-US" dirty="0" smtClean="0"/>
+          </a:p>
+          <a:p>
+            <a:pPr marL="742950" lvl="1" indent="-285750">
+              <a:buFont typeface="Arial" panose="020B0604020202020204" pitchFamily="34" charset="0"/>
+              <a:buChar char="•"/>
+            </a:pPr>
+            <a:r>
+              <a:rPr lang="en-US" dirty="0" smtClean="0"/>
+              <a:t>Then removed excess pixels</a:t>
+            </a:r>
+          </a:p>
+          <a:p>
+            <a:pPr marL="742950" lvl="1" indent="-285750">
+              <a:buFont typeface="Arial" panose="020B0604020202020204" pitchFamily="34" charset="0"/>
+              <a:buChar char="•"/>
+            </a:pPr>
+            <a:endParaRPr lang="en-US" dirty="0"/>
+          </a:p>
+          <a:p>
+            <a:pPr marL="285750" indent="-285750">
+              <a:buFont typeface="Arial" panose="020B0604020202020204" pitchFamily="34" charset="0"/>
+              <a:buChar char="•"/>
+            </a:pPr>
+            <a:r>
+              <a:rPr lang="en-US" dirty="0" smtClean="0"/>
+              <a:t>Attempts to detect concrete regions</a:t>
+            </a:r>
+            <a:endParaRPr lang="en-US" dirty="0"/>
+          </a:p>
+          <a:p>
+            <a:r>
+              <a:rPr lang="en-US" dirty="0"/>
+              <a:t>	</a:t>
+            </a:r>
+            <a:r>
+              <a:rPr lang="en-US" dirty="0" smtClean="0"/>
+              <a:t>*assumes the primary focus of the image is the concrete structure</a:t>
+            </a:r>
+          </a:p>
+          <a:p>
+            <a:r>
+              <a:rPr lang="en-US" dirty="0"/>
+              <a:t>	</a:t>
+            </a:r>
+            <a:r>
+              <a:rPr lang="en-US" dirty="0" smtClean="0"/>
+              <a:t>*assumes limited obstruction to the concrete structure</a:t>
+            </a:r>
+          </a:p>
+        </p:txBody>
+      </p:sp>
+      <p:sp>
+        <p:nvSpPr>
+          <p:cNvPr id="5" name="Content Placeholder 2"/>
+          <p:cNvSpPr>
+            <a:spLocks noGrp="1"/>
+          </p:cNvSpPr>
+          <p:nvPr>
+            <p:ph sz="half" idx="1"/>
+          </p:nvPr>
+        </p:nvSpPr>
+        <p:spPr>
+          <a:xfrm>
+            <a:off x="581193" y="2228003"/>
+            <a:ext cx="2688218" cy="4276314"/>
+          </a:xfrm>
+          <a:solidFill>
+            <a:schemeClr val="accent2">
+              <a:lumMod val="60000"/>
+              <a:lumOff val="40000"/>
+            </a:schemeClr>
+          </a:solidFill>
+        </p:spPr>
+        <p:txBody>
+          <a:bodyPr>
+            <a:normAutofit/>
+          </a:bodyPr>
+          <a:lstStyle/>
+          <a:p>
+            <a:endParaRPr lang="en-US" dirty="0" smtClean="0"/>
+          </a:p>
+          <a:p>
+            <a:endParaRPr lang="en-US" dirty="0"/>
+          </a:p>
+          <a:p>
+            <a:r>
+              <a:rPr lang="en-US" dirty="0" smtClean="0"/>
+              <a:t>Desired Outcomes</a:t>
+            </a:r>
+          </a:p>
+          <a:p>
+            <a:r>
+              <a:rPr lang="en-US" dirty="0" smtClean="0"/>
+              <a:t>Related Methods</a:t>
+            </a:r>
+          </a:p>
+          <a:p>
+            <a:r>
+              <a:rPr lang="en-US" dirty="0" smtClean="0"/>
+              <a:t>Proposed Approach</a:t>
+            </a:r>
+          </a:p>
+          <a:p>
+            <a:r>
+              <a:rPr lang="en-US" dirty="0" smtClean="0"/>
+              <a:t>Shortcomings</a:t>
+            </a:r>
+          </a:p>
+          <a:p>
+            <a:r>
+              <a:rPr lang="en-US" b="1" dirty="0" smtClean="0"/>
+              <a:t>My Improvements</a:t>
+            </a:r>
+          </a:p>
+          <a:p>
+            <a:r>
+              <a:rPr lang="en-US" dirty="0" smtClean="0"/>
+              <a:t>Summary</a:t>
+            </a:r>
+          </a:p>
+          <a:p>
+            <a:r>
+              <a:rPr lang="en-US" dirty="0" smtClean="0"/>
+              <a:t>Future Work</a:t>
+            </a:r>
+          </a:p>
+          <a:p>
+            <a:endParaRPr lang="en-US" dirty="0" smtClean="0"/>
+          </a:p>
+          <a:p>
             <a:endParaRPr lang="en-US" dirty="0"/>
           </a:p>
         </p:txBody>
@@ -4680,7 +6504,156 @@
     </p:spTree>
     <p:extLst>
       <p:ext uri="{BB962C8B-B14F-4D97-AF65-F5344CB8AC3E}">
-        <p14:creationId xmlns:p14="http://schemas.microsoft.com/office/powerpoint/2010/main" val="2209971306"/>
+        <p14:creationId xmlns:p14="http://schemas.microsoft.com/office/powerpoint/2010/main" val="2094722029"/>
+      </p:ext>
+    </p:extLst>
+  </p:cSld>
+  <p:clrMapOvr>
+    <a:masterClrMapping/>
+  </p:clrMapOvr>
+  <p:timing>
+    <p:tnLst>
+      <p:par>
+        <p:cTn id="1" dur="indefinite" restart="never" nodeType="tmRoot"/>
+      </p:par>
+    </p:tnLst>
+  </p:timing>
+</p:sld>
+</file>
+
+<file path=ppt/slides/slide9.xml><?xml version="1.0" encoding="utf-8"?>
+<p:sld xmlns:a="http://schemas.openxmlformats.org/drawingml/2006/main" xmlns:r="http://schemas.openxmlformats.org/officeDocument/2006/relationships" xmlns:p="http://schemas.openxmlformats.org/presentationml/2006/main">
+  <p:cSld>
+    <p:spTree>
+      <p:nvGrpSpPr>
+        <p:cNvPr id="1" name=""/>
+        <p:cNvGrpSpPr/>
+        <p:nvPr/>
+      </p:nvGrpSpPr>
+      <p:grpSpPr>
+        <a:xfrm>
+          <a:off x="0" y="0"/>
+          <a:ext cx="0" cy="0"/>
+          <a:chOff x="0" y="0"/>
+          <a:chExt cx="0" cy="0"/>
+        </a:xfrm>
+      </p:grpSpPr>
+      <p:sp>
+        <p:nvSpPr>
+          <p:cNvPr id="2" name="Title 1"/>
+          <p:cNvSpPr>
+            <a:spLocks noGrp="1"/>
+          </p:cNvSpPr>
+          <p:nvPr>
+            <p:ph type="title"/>
+          </p:nvPr>
+        </p:nvSpPr>
+        <p:spPr/>
+        <p:txBody>
+          <a:bodyPr/>
+          <a:lstStyle/>
+          <a:p>
+            <a:r>
+              <a:rPr lang="en-US" dirty="0" smtClean="0"/>
+              <a:t>My Improvements on the proposed </a:t>
+            </a:r>
+            <a:r>
+              <a:rPr lang="en-US" dirty="0"/>
+              <a:t>approach (continued)</a:t>
+            </a:r>
+            <a:endParaRPr lang="en-US" dirty="0"/>
+          </a:p>
+        </p:txBody>
+      </p:sp>
+      <p:sp>
+        <p:nvSpPr>
+          <p:cNvPr id="3" name="Content Placeholder 2"/>
+          <p:cNvSpPr>
+            <a:spLocks noGrp="1"/>
+          </p:cNvSpPr>
+          <p:nvPr>
+            <p:ph sz="half" idx="1"/>
+          </p:nvPr>
+        </p:nvSpPr>
+        <p:spPr>
+          <a:xfrm>
+            <a:off x="581193" y="2228003"/>
+            <a:ext cx="2688218" cy="3633047"/>
+          </a:xfrm>
+        </p:spPr>
+        <p:txBody>
+          <a:bodyPr/>
+          <a:lstStyle/>
+          <a:p>
+            <a:r>
+              <a:rPr lang="en-US" dirty="0" smtClean="0"/>
+              <a:t>Proposed Method Execution Time:</a:t>
+            </a:r>
+          </a:p>
+          <a:p>
+            <a:pPr lvl="1"/>
+            <a:r>
+              <a:rPr lang="en-US" dirty="0" smtClean="0"/>
+              <a:t>~ 0.003534 seconds</a:t>
+            </a:r>
+          </a:p>
+          <a:p>
+            <a:endParaRPr lang="en-US" dirty="0"/>
+          </a:p>
+          <a:p>
+            <a:r>
+              <a:rPr lang="en-US" dirty="0" smtClean="0"/>
+              <a:t>Improved Proposed Method Execution Time:</a:t>
+            </a:r>
+          </a:p>
+          <a:p>
+            <a:pPr lvl="1"/>
+            <a:r>
+              <a:rPr lang="en-US" dirty="0" smtClean="0"/>
+              <a:t>~ 0.041107 seconds</a:t>
+            </a:r>
+            <a:endParaRPr lang="en-US" dirty="0"/>
+          </a:p>
+        </p:txBody>
+      </p:sp>
+      <p:sp>
+        <p:nvSpPr>
+          <p:cNvPr id="6" name="TextBox 5"/>
+          <p:cNvSpPr txBox="1"/>
+          <p:nvPr/>
+        </p:nvSpPr>
+        <p:spPr>
+          <a:xfrm>
+            <a:off x="4166559" y="2474865"/>
+            <a:ext cx="7142326" cy="369332"/>
+          </a:xfrm>
+          <a:prstGeom prst="rect">
+            <a:avLst/>
+          </a:prstGeom>
+          <a:noFill/>
+        </p:spPr>
+        <p:txBody>
+          <a:bodyPr wrap="square" rtlCol="0">
+            <a:spAutoFit/>
+          </a:bodyPr>
+          <a:lstStyle/>
+          <a:p>
+            <a:pPr marL="285750" indent="-285750">
+              <a:buFont typeface="Arial" panose="020B0604020202020204" pitchFamily="34" charset="0"/>
+              <a:buChar char="•"/>
+            </a:pPr>
+            <a:r>
+              <a:rPr lang="en-US" dirty="0" smtClean="0"/>
+              <a:t>PLACE NEW WORKFLOW IMAGE HERE!@!@!@!@</a:t>
+            </a:r>
+            <a:endParaRPr lang="en-US" dirty="0"/>
+          </a:p>
+        </p:txBody>
+      </p:sp>
+    </p:spTree>
+    <p:extLst>
+      <p:ext uri="{BB962C8B-B14F-4D97-AF65-F5344CB8AC3E}">
+        <p14:creationId xmlns:p14="http://schemas.microsoft.com/office/powerpoint/2010/main" val="728023486"/>
       </p:ext>
     </p:extLst>
   </p:cSld>

</xml_diff>